<commit_message>
Add OAuth hands-on activity and update slides
- Add new OAuth activity (activities/oauth.md) with live demo and oauth2-demo walkthrough
- Update week 4 schedule to include OAuth activity alongside cert chains and GPG
- Update authentication slides
</commit_message>
<xml_diff>
--- a/docs/slides/04-Authenticaation.pptx
+++ b/docs/slides/04-Authenticaation.pptx
@@ -5,7 +5,7 @@
     <p:sldMasterId id="2147483684" r:id="rId1"/>
   </p:sldMasterIdLst>
   <p:notesMasterIdLst>
-    <p:notesMasterId r:id="rId59"/>
+    <p:notesMasterId r:id="rId60"/>
   </p:notesMasterIdLst>
   <p:sldIdLst>
     <p:sldId id="506" r:id="rId2"/>
@@ -29,10 +29,10 @@
     <p:sldId id="471" r:id="rId20"/>
     <p:sldId id="458" r:id="rId21"/>
     <p:sldId id="578" r:id="rId22"/>
-    <p:sldId id="257" r:id="rId23"/>
-    <p:sldId id="258" r:id="rId24"/>
-    <p:sldId id="259" r:id="rId25"/>
-    <p:sldId id="260" r:id="rId26"/>
+    <p:sldId id="260" r:id="rId23"/>
+    <p:sldId id="257" r:id="rId24"/>
+    <p:sldId id="258" r:id="rId25"/>
+    <p:sldId id="259" r:id="rId26"/>
     <p:sldId id="261" r:id="rId27"/>
     <p:sldId id="262" r:id="rId28"/>
     <p:sldId id="263" r:id="rId29"/>
@@ -40,31 +40,32 @@
     <p:sldId id="265" r:id="rId31"/>
     <p:sldId id="266" r:id="rId32"/>
     <p:sldId id="579" r:id="rId33"/>
-    <p:sldId id="580" r:id="rId34"/>
-    <p:sldId id="582" r:id="rId35"/>
-    <p:sldId id="271" r:id="rId36"/>
-    <p:sldId id="272" r:id="rId37"/>
-    <p:sldId id="273" r:id="rId38"/>
-    <p:sldId id="583" r:id="rId39"/>
-    <p:sldId id="584" r:id="rId40"/>
-    <p:sldId id="274" r:id="rId41"/>
-    <p:sldId id="276" r:id="rId42"/>
-    <p:sldId id="277" r:id="rId43"/>
-    <p:sldId id="278" r:id="rId44"/>
-    <p:sldId id="279" r:id="rId45"/>
-    <p:sldId id="572" r:id="rId46"/>
-    <p:sldId id="573" r:id="rId47"/>
-    <p:sldId id="575" r:id="rId48"/>
-    <p:sldId id="450" r:id="rId49"/>
-    <p:sldId id="452" r:id="rId50"/>
-    <p:sldId id="576" r:id="rId51"/>
-    <p:sldId id="463" r:id="rId52"/>
-    <p:sldId id="464" r:id="rId53"/>
-    <p:sldId id="468" r:id="rId54"/>
-    <p:sldId id="581" r:id="rId55"/>
-    <p:sldId id="467" r:id="rId56"/>
-    <p:sldId id="465" r:id="rId57"/>
-    <p:sldId id="466" r:id="rId58"/>
+    <p:sldId id="267" r:id="rId34"/>
+    <p:sldId id="580" r:id="rId35"/>
+    <p:sldId id="582" r:id="rId36"/>
+    <p:sldId id="271" r:id="rId37"/>
+    <p:sldId id="272" r:id="rId38"/>
+    <p:sldId id="273" r:id="rId39"/>
+    <p:sldId id="583" r:id="rId40"/>
+    <p:sldId id="584" r:id="rId41"/>
+    <p:sldId id="274" r:id="rId42"/>
+    <p:sldId id="276" r:id="rId43"/>
+    <p:sldId id="277" r:id="rId44"/>
+    <p:sldId id="278" r:id="rId45"/>
+    <p:sldId id="279" r:id="rId46"/>
+    <p:sldId id="572" r:id="rId47"/>
+    <p:sldId id="573" r:id="rId48"/>
+    <p:sldId id="575" r:id="rId49"/>
+    <p:sldId id="450" r:id="rId50"/>
+    <p:sldId id="452" r:id="rId51"/>
+    <p:sldId id="576" r:id="rId52"/>
+    <p:sldId id="463" r:id="rId53"/>
+    <p:sldId id="464" r:id="rId54"/>
+    <p:sldId id="468" r:id="rId55"/>
+    <p:sldId id="581" r:id="rId56"/>
+    <p:sldId id="467" r:id="rId57"/>
+    <p:sldId id="465" r:id="rId58"/>
+    <p:sldId id="466" r:id="rId59"/>
   </p:sldIdLst>
   <p:sldSz cx="9144000" cy="5143500" type="screen16x9"/>
   <p:notesSz cx="6858000" cy="9144000"/>
@@ -7420,7 +7421,7 @@
           <a:lstStyle/>
           <a:p>
             <a:r>
-              <a:t>OAuth 2 is fundamentally a delegation protocol. It’s not an authentication system like you’d use for logging in, but rather a way for a user to give an app limited access to their data—say, letting Spotify read your playlists without giving it your Google password.</a:t>
+              <a:t>Before OAuth, third-party apps often just asked users for their passwords. That’s terrible for security because it gives away full control and there’s no way to limit access or revoke it cleanly.</a:t>
             </a:r>
           </a:p>
         </p:txBody>
@@ -7580,8 +7581,43 @@
           <a:lstStyle/>
           <a:p>
             <a:r>
-              <a:t>There are four key roles. The resource owner is the user. The client is the third-party app. The authorization server issues tokens once the user consents. The resource server hosts the protected resource and verifies the token.</a:t>
-            </a:r>
+              <a:rPr dirty="0"/>
+              <a:t>OAuth 2 is fundamentally a delegation protocol. It’s not an authentication system like you’d use for logging in, but rather a way for a user to give an app limited access to their data—say, letting Spotify read your playlists without giving it your Google password.</a:t>
+            </a:r>
+            <a:endParaRPr lang="en-US" dirty="0"/>
+          </a:p>
+          <a:p>
+            <a:endParaRPr lang="en-US" dirty="0"/>
+          </a:p>
+          <a:p>
+            <a:r>
+              <a:rPr lang="en-US" dirty="0"/>
+              <a:t>OAuth separates </a:t>
+            </a:r>
+            <a:r>
+              <a:rPr lang="en-US" b="1" dirty="0"/>
+              <a:t>authentication</a:t>
+            </a:r>
+            <a:r>
+              <a:rPr lang="en-US" dirty="0"/>
+              <a:t> (user proving who they are) from </a:t>
+            </a:r>
+            <a:r>
+              <a:rPr lang="en-US" b="1" dirty="0"/>
+              <a:t>authorization</a:t>
+            </a:r>
+            <a:r>
+              <a:rPr lang="en-US" dirty="0"/>
+              <a:t> (allowing limited access).</a:t>
+            </a:r>
+            <a:br>
+              <a:rPr lang="en-US" dirty="0"/>
+            </a:br>
+            <a:r>
+              <a:rPr lang="en-US" dirty="0"/>
+              <a:t>The app never sees the user’s credentials—only tokens that can be limited, revoked, or expired.</a:t>
+            </a:r>
+            <a:endParaRPr dirty="0"/>
           </a:p>
         </p:txBody>
       </p:sp>
@@ -7650,7 +7686,7 @@
           <a:lstStyle/>
           <a:p>
             <a:r>
-              <a:t>The key concept is the access token, which represents limited rights. The typical flow involves the user authorizing, the client receiving a grant, exchanging it for a token, and then using that token to access the resource server.</a:t>
+              <a:t>There are four key roles. The resource owner is the user. The client is the third-party app. The authorization server issues tokens once the user consents. The resource server hosts the protected resource and verifies the token.</a:t>
             </a:r>
           </a:p>
         </p:txBody>
@@ -7720,7 +7756,7 @@
           <a:lstStyle/>
           <a:p>
             <a:r>
-              <a:t>Before OAuth, third-party apps often just asked users for their passwords. That’s terrible for security because it gives away full control and there’s no way to limit access or revoke it cleanly.</a:t>
+              <a:t>The key concept is the access token, which represents limited rights. The typical flow involves the user authorizing, the client receiving a grant, exchanging it for a token, and then using that token to access the resource server.</a:t>
             </a:r>
           </a:p>
         </p:txBody>
@@ -8209,6 +8245,533 @@
           <a:bodyPr/>
           <a:lstStyle/>
           <a:p>
+            <a:r>
+              <a:rPr lang="en-US" b="1" dirty="0"/>
+              <a:t>Step 1 – Authorization Request</a:t>
+            </a:r>
+          </a:p>
+          <a:p>
+            <a:r>
+              <a:rPr lang="en-US" dirty="0"/>
+              <a:t>The </a:t>
+            </a:r>
+            <a:r>
+              <a:rPr lang="en-US" b="1" dirty="0"/>
+              <a:t>client</a:t>
+            </a:r>
+            <a:r>
+              <a:rPr lang="en-US" dirty="0"/>
+              <a:t> (third-party app) asks the </a:t>
+            </a:r>
+            <a:r>
+              <a:rPr lang="en-US" b="1" dirty="0"/>
+              <a:t>resource owner</a:t>
+            </a:r>
+            <a:r>
+              <a:rPr lang="en-US" dirty="0"/>
+              <a:t> (end user) for permission to access a protected resource.</a:t>
+            </a:r>
+            <a:br>
+              <a:rPr lang="en-US" dirty="0"/>
+            </a:br>
+            <a:r>
+              <a:rPr lang="en-US" dirty="0"/>
+              <a:t>Example: A printing service asks the user to connect their Google Drive account.</a:t>
+            </a:r>
+          </a:p>
+          <a:p>
+            <a:r>
+              <a:rPr lang="en-US" b="1" dirty="0"/>
+              <a:t>→ Outcome:</a:t>
+            </a:r>
+            <a:r>
+              <a:rPr lang="en-US" dirty="0"/>
+              <a:t> The user is redirected to the </a:t>
+            </a:r>
+            <a:r>
+              <a:rPr lang="en-US" b="1" dirty="0"/>
+              <a:t>authorization server</a:t>
+            </a:r>
+            <a:r>
+              <a:rPr lang="en-US" dirty="0"/>
+              <a:t> (e.g., Google).</a:t>
+            </a:r>
+          </a:p>
+          <a:p>
+            <a:br>
+              <a:rPr lang="en-US" dirty="0"/>
+            </a:br>
+            <a:endParaRPr lang="en-US" dirty="0"/>
+          </a:p>
+          <a:p>
+            <a:r>
+              <a:rPr lang="en-US" b="1" dirty="0"/>
+              <a:t>Step 2 – Authorization Grant</a:t>
+            </a:r>
+          </a:p>
+          <a:p>
+            <a:r>
+              <a:rPr lang="en-US" dirty="0"/>
+              <a:t>The </a:t>
+            </a:r>
+            <a:r>
+              <a:rPr lang="en-US" b="1" dirty="0"/>
+              <a:t>resource owner</a:t>
+            </a:r>
+            <a:r>
+              <a:rPr lang="en-US" dirty="0"/>
+              <a:t> logs in and approves the request.</a:t>
+            </a:r>
+            <a:br>
+              <a:rPr lang="en-US" dirty="0"/>
+            </a:br>
+            <a:r>
+              <a:rPr lang="en-US" dirty="0"/>
+              <a:t>The </a:t>
+            </a:r>
+            <a:r>
+              <a:rPr lang="en-US" b="1" dirty="0"/>
+              <a:t>authorization server</a:t>
+            </a:r>
+            <a:r>
+              <a:rPr lang="en-US" dirty="0"/>
+              <a:t> issues an </a:t>
+            </a:r>
+            <a:r>
+              <a:rPr lang="en-US" b="1" dirty="0"/>
+              <a:t>authorization grant</a:t>
+            </a:r>
+            <a:r>
+              <a:rPr lang="en-US" dirty="0"/>
+              <a:t> (a short code) back to the </a:t>
+            </a:r>
+            <a:r>
+              <a:rPr lang="en-US" b="1" dirty="0"/>
+              <a:t>client</a:t>
+            </a:r>
+            <a:r>
+              <a:rPr lang="en-US" dirty="0"/>
+              <a:t>.</a:t>
+            </a:r>
+          </a:p>
+          <a:p>
+            <a:r>
+              <a:rPr lang="en-US" b="1" dirty="0"/>
+              <a:t>→ Outcome:</a:t>
+            </a:r>
+            <a:r>
+              <a:rPr lang="en-US" dirty="0"/>
+              <a:t> The client now holds a temporary code proving user consent.</a:t>
+            </a:r>
+          </a:p>
+          <a:p>
+            <a:br>
+              <a:rPr lang="en-US" dirty="0"/>
+            </a:br>
+            <a:endParaRPr lang="en-US" dirty="0"/>
+          </a:p>
+          <a:p>
+            <a:r>
+              <a:rPr lang="en-US" b="1" dirty="0"/>
+              <a:t>Step 3 – Authorization Grant Sent to Authorization Server</a:t>
+            </a:r>
+          </a:p>
+          <a:p>
+            <a:r>
+              <a:rPr lang="en-US" dirty="0"/>
+              <a:t>The </a:t>
+            </a:r>
+            <a:r>
+              <a:rPr lang="en-US" b="1" dirty="0"/>
+              <a:t>client</a:t>
+            </a:r>
+            <a:r>
+              <a:rPr lang="en-US" dirty="0"/>
+              <a:t> sends that authorization grant to the </a:t>
+            </a:r>
+            <a:r>
+              <a:rPr lang="en-US" b="1" dirty="0"/>
+              <a:t>authorization server</a:t>
+            </a:r>
+            <a:r>
+              <a:rPr lang="en-US" dirty="0"/>
+              <a:t> (direct server-to-server, not via user).</a:t>
+            </a:r>
+            <a:br>
+              <a:rPr lang="en-US" dirty="0"/>
+            </a:br>
+            <a:r>
+              <a:rPr lang="en-US" dirty="0"/>
+              <a:t>It includes its own client credentials for verification.</a:t>
+            </a:r>
+          </a:p>
+          <a:p>
+            <a:br>
+              <a:rPr lang="en-US" dirty="0"/>
+            </a:br>
+            <a:endParaRPr lang="en-US" dirty="0"/>
+          </a:p>
+          <a:p>
+            <a:r>
+              <a:rPr lang="en-US" b="1" dirty="0"/>
+              <a:t>Step 4 – Access Token Issued</a:t>
+            </a:r>
+          </a:p>
+          <a:p>
+            <a:r>
+              <a:rPr lang="en-US" dirty="0"/>
+              <a:t>The </a:t>
+            </a:r>
+            <a:r>
+              <a:rPr lang="en-US" b="1" dirty="0"/>
+              <a:t>authorization server</a:t>
+            </a:r>
+            <a:r>
+              <a:rPr lang="en-US" dirty="0"/>
+              <a:t> validates the grant and issues an </a:t>
+            </a:r>
+            <a:r>
+              <a:rPr lang="en-US" b="1" dirty="0"/>
+              <a:t>access token</a:t>
+            </a:r>
+            <a:r>
+              <a:rPr lang="en-US" dirty="0"/>
+              <a:t> to the </a:t>
+            </a:r>
+            <a:r>
+              <a:rPr lang="en-US" b="1" dirty="0"/>
+              <a:t>client</a:t>
+            </a:r>
+            <a:r>
+              <a:rPr lang="en-US" dirty="0"/>
+              <a:t>.</a:t>
+            </a:r>
+            <a:br>
+              <a:rPr lang="en-US" dirty="0"/>
+            </a:br>
+            <a:r>
+              <a:rPr lang="en-US" dirty="0"/>
+              <a:t>This token represents the permission to access the protected resource on behalf of the user.</a:t>
+            </a:r>
+          </a:p>
+          <a:p>
+            <a:r>
+              <a:rPr lang="en-US" b="1" dirty="0"/>
+              <a:t>→ Outcome:</a:t>
+            </a:r>
+            <a:r>
+              <a:rPr lang="en-US" dirty="0"/>
+              <a:t> The client now has an access token.</a:t>
+            </a:r>
+          </a:p>
+          <a:p>
+            <a:br>
+              <a:rPr lang="en-US" dirty="0"/>
+            </a:br>
+            <a:endParaRPr lang="en-US" dirty="0"/>
+          </a:p>
+          <a:p>
+            <a:r>
+              <a:rPr lang="en-US" b="1" dirty="0"/>
+              <a:t>Step 5 – Access Token Used</a:t>
+            </a:r>
+          </a:p>
+          <a:p>
+            <a:r>
+              <a:rPr lang="en-US" dirty="0"/>
+              <a:t>The </a:t>
+            </a:r>
+            <a:r>
+              <a:rPr lang="en-US" b="1" dirty="0"/>
+              <a:t>client</a:t>
+            </a:r>
+            <a:r>
+              <a:rPr lang="en-US" dirty="0"/>
+              <a:t> sends the access token to the </a:t>
+            </a:r>
+            <a:r>
+              <a:rPr lang="en-US" b="1" dirty="0"/>
+              <a:t>resource server</a:t>
+            </a:r>
+            <a:r>
+              <a:rPr lang="en-US" dirty="0"/>
+              <a:t> (e.g., Google Drive API) to request the protected resource.</a:t>
+            </a:r>
+          </a:p>
+          <a:p>
+            <a:r>
+              <a:rPr lang="en-US" b="1" dirty="0"/>
+              <a:t>→ Outcome:</a:t>
+            </a:r>
+            <a:r>
+              <a:rPr lang="en-US" dirty="0"/>
+              <a:t> The resource server verifies the token’s validity.</a:t>
+            </a:r>
+          </a:p>
+          <a:p>
+            <a:br>
+              <a:rPr lang="en-US" dirty="0"/>
+            </a:br>
+            <a:endParaRPr lang="en-US" dirty="0"/>
+          </a:p>
+          <a:p>
+            <a:r>
+              <a:rPr lang="en-US" b="1" dirty="0"/>
+              <a:t>Step 6 – Protected Resource Returned</a:t>
+            </a:r>
+          </a:p>
+          <a:p>
+            <a:r>
+              <a:rPr lang="en-US" dirty="0"/>
+              <a:t>If the token is valid, the </a:t>
+            </a:r>
+            <a:r>
+              <a:rPr lang="en-US" b="1" dirty="0"/>
+              <a:t>resource server</a:t>
+            </a:r>
+            <a:r>
+              <a:rPr lang="en-US" dirty="0"/>
+              <a:t> returns the requested resource (e.g., a Google Drive photo).</a:t>
+            </a:r>
+          </a:p>
+          <a:p>
+            <a:r>
+              <a:rPr lang="en-US" b="1" dirty="0"/>
+              <a:t>→ Outcome:</a:t>
+            </a:r>
+            <a:r>
+              <a:rPr lang="en-US" dirty="0"/>
+              <a:t> The client accesses the data securely, without seeing or storing the user’s password.</a:t>
+            </a:r>
+          </a:p>
+          <a:p>
+            <a:endParaRPr lang="en-US" b="1" dirty="0"/>
+          </a:p>
+          <a:p>
+            <a:r>
+              <a:rPr lang="en-US" b="1" dirty="0"/>
+              <a:t>-------------</a:t>
+            </a:r>
+          </a:p>
+          <a:p>
+            <a:endParaRPr lang="en-US" b="1" dirty="0"/>
+          </a:p>
+          <a:p>
+            <a:endParaRPr lang="en-US" b="1" dirty="0"/>
+          </a:p>
+          <a:p>
+            <a:endParaRPr lang="en-US" b="1" dirty="0"/>
+          </a:p>
+          <a:p>
+            <a:r>
+              <a:rPr lang="en-US" b="1" dirty="0"/>
+              <a:t>Step 1 – User authorizes the app</a:t>
+            </a:r>
+          </a:p>
+          <a:p>
+            <a:r>
+              <a:rPr lang="en-US" dirty="0"/>
+              <a:t>The user (resource owner) clicks </a:t>
+            </a:r>
+            <a:r>
+              <a:rPr lang="en-US" i="1" dirty="0"/>
+              <a:t>“Log in with Google”</a:t>
+            </a:r>
+            <a:r>
+              <a:rPr lang="en-US" dirty="0"/>
+              <a:t> (or similar) in the third-party app (the client).</a:t>
+            </a:r>
+          </a:p>
+          <a:p>
+            <a:r>
+              <a:rPr lang="en-US" dirty="0"/>
+              <a:t>The app redirects the user to the </a:t>
+            </a:r>
+            <a:r>
+              <a:rPr lang="en-US" b="1" dirty="0"/>
+              <a:t>authorization server</a:t>
+            </a:r>
+            <a:r>
+              <a:rPr lang="en-US" dirty="0"/>
+              <a:t> (e.g., Google).</a:t>
+            </a:r>
+          </a:p>
+          <a:p>
+            <a:r>
+              <a:rPr lang="en-US" dirty="0"/>
+              <a:t>The user logs in and approves the app’s access request.</a:t>
+            </a:r>
+          </a:p>
+          <a:p>
+            <a:r>
+              <a:rPr lang="en-US" b="1" dirty="0"/>
+              <a:t>→ Outcome:</a:t>
+            </a:r>
+            <a:r>
+              <a:rPr lang="en-US" dirty="0"/>
+              <a:t> The app gets a short-lived </a:t>
+            </a:r>
+            <a:r>
+              <a:rPr lang="en-US" i="1" dirty="0"/>
+              <a:t>authorization code.</a:t>
+            </a:r>
+            <a:endParaRPr lang="en-US" dirty="0"/>
+          </a:p>
+          <a:p>
+            <a:br>
+              <a:rPr lang="en-US" dirty="0"/>
+            </a:br>
+            <a:endParaRPr lang="en-US" dirty="0"/>
+          </a:p>
+          <a:p>
+            <a:r>
+              <a:rPr lang="en-US" b="1" dirty="0"/>
+              <a:t>Step 2 – App requests a token</a:t>
+            </a:r>
+          </a:p>
+          <a:p>
+            <a:r>
+              <a:rPr lang="en-US" dirty="0"/>
+              <a:t>The app sends that authorization code to the </a:t>
+            </a:r>
+            <a:r>
+              <a:rPr lang="en-US" b="1" dirty="0"/>
+              <a:t>authorization server</a:t>
+            </a:r>
+            <a:r>
+              <a:rPr lang="en-US" dirty="0"/>
+              <a:t> (not the user).</a:t>
+            </a:r>
+          </a:p>
+          <a:p>
+            <a:r>
+              <a:rPr lang="en-US" dirty="0"/>
+              <a:t>It includes its client ID/secret to prove its identity.</a:t>
+            </a:r>
+          </a:p>
+          <a:p>
+            <a:r>
+              <a:rPr lang="en-US" dirty="0"/>
+              <a:t>The authorization server verifies everything and returns an </a:t>
+            </a:r>
+            <a:r>
+              <a:rPr lang="en-US" b="1" dirty="0"/>
+              <a:t>access token</a:t>
+            </a:r>
+            <a:r>
+              <a:rPr lang="en-US" dirty="0"/>
+              <a:t> (and sometimes a refresh token).</a:t>
+            </a:r>
+          </a:p>
+          <a:p>
+            <a:r>
+              <a:rPr lang="en-US" b="1" dirty="0"/>
+              <a:t>→ Outcome:</a:t>
+            </a:r>
+            <a:r>
+              <a:rPr lang="en-US" dirty="0"/>
+              <a:t> The app now holds an </a:t>
+            </a:r>
+            <a:r>
+              <a:rPr lang="en-US" i="1" dirty="0"/>
+              <a:t>access token</a:t>
+            </a:r>
+            <a:r>
+              <a:rPr lang="en-US" dirty="0"/>
+              <a:t> that represents permission to act on the user’s behalf.</a:t>
+            </a:r>
+          </a:p>
+          <a:p>
+            <a:br>
+              <a:rPr lang="en-US" dirty="0"/>
+            </a:br>
+            <a:endParaRPr lang="en-US" dirty="0"/>
+          </a:p>
+          <a:p>
+            <a:r>
+              <a:rPr lang="en-US" b="1" dirty="0"/>
+              <a:t>Step 3 – App uses the token</a:t>
+            </a:r>
+          </a:p>
+          <a:p>
+            <a:r>
+              <a:rPr lang="en-US" dirty="0"/>
+              <a:t>The app calls the </a:t>
+            </a:r>
+            <a:r>
+              <a:rPr lang="en-US" b="1" dirty="0"/>
+              <a:t>resource server</a:t>
+            </a:r>
+            <a:r>
+              <a:rPr lang="en-US" dirty="0"/>
+              <a:t> (e.g., Google API) with the token in the HTTP header.</a:t>
+            </a:r>
+          </a:p>
+          <a:p>
+            <a:r>
+              <a:rPr lang="en-US" dirty="0"/>
+              <a:t>The resource server checks the token’s validity (e.g., with the authorization server).</a:t>
+            </a:r>
+          </a:p>
+          <a:p>
+            <a:r>
+              <a:rPr lang="en-US" dirty="0"/>
+              <a:t>If valid, it serves the requested data (e.g., calendar, profile info, etc.).</a:t>
+            </a:r>
+          </a:p>
+          <a:p>
+            <a:r>
+              <a:rPr lang="en-US" b="1" dirty="0"/>
+              <a:t>→ Outcome:</a:t>
+            </a:r>
+            <a:r>
+              <a:rPr lang="en-US" dirty="0"/>
+              <a:t> The user’s data is accessed securely, without sharing passwords.</a:t>
+            </a:r>
+          </a:p>
+          <a:p>
+            <a:br>
+              <a:rPr lang="en-US" dirty="0"/>
+            </a:br>
+            <a:endParaRPr lang="en-US" dirty="0"/>
+          </a:p>
+          <a:p>
+            <a:r>
+              <a:rPr lang="en-US" b="1" dirty="0"/>
+              <a:t>Step 4 – Token expiration / refresh</a:t>
+            </a:r>
+          </a:p>
+          <a:p>
+            <a:r>
+              <a:rPr lang="en-US" dirty="0"/>
+              <a:t>Access tokens are short-lived.</a:t>
+            </a:r>
+          </a:p>
+          <a:p>
+            <a:r>
+              <a:rPr lang="en-US" dirty="0"/>
+              <a:t>When they expire, the app can use a </a:t>
+            </a:r>
+            <a:r>
+              <a:rPr lang="en-US" i="1" dirty="0"/>
+              <a:t>refresh token</a:t>
+            </a:r>
+            <a:r>
+              <a:rPr lang="en-US" dirty="0"/>
+              <a:t> (if issued) to get a new one from the authorization server.</a:t>
+            </a:r>
+          </a:p>
+          <a:p>
+            <a:r>
+              <a:rPr lang="en-US" b="1" dirty="0"/>
+              <a:t>→ Outcome:</a:t>
+            </a:r>
+            <a:r>
+              <a:rPr lang="en-US" dirty="0"/>
+              <a:t> Continuous access without re-prompting the user.</a:t>
+            </a:r>
+          </a:p>
+          <a:p>
             <a:endParaRPr lang="en-US" dirty="0"/>
           </a:p>
         </p:txBody>
@@ -8231,7 +8794,7 @@
             <a:fld id="{E4EDBFAA-E3FF-41DC-96EC-6BC8A2B7A07F}" type="slidenum">
               <a:rPr lang="en-US" smtClean="0"/>
               <a:pPr/>
-              <a:t>33</a:t>
+              <a:t>32</a:t>
             </a:fld>
             <a:endParaRPr lang="en-US"/>
           </a:p>
@@ -8240,7 +8803,7 @@
     </p:spTree>
     <p:extLst>
       <p:ext uri="{BB962C8B-B14F-4D97-AF65-F5344CB8AC3E}">
-        <p14:creationId xmlns:p14="http://schemas.microsoft.com/office/powerpoint/2010/main" val="1016426800"/>
+        <p14:creationId xmlns:p14="http://schemas.microsoft.com/office/powerpoint/2010/main" val="638517227"/>
       </p:ext>
     </p:extLst>
   </p:cSld>
@@ -8409,7 +8972,7 @@
             <a:spLocks noGrp="1" noRot="1" noChangeAspect="1"/>
           </p:cNvSpPr>
           <p:nvPr>
-            <p:ph type="sldImg"/>
+            <p:ph type="sldImg" idx="2"/>
           </p:nvPr>
         </p:nvSpPr>
         <p:spPr/>
@@ -8421,7 +8984,7 @@
             <a:spLocks noGrp="1"/>
           </p:cNvSpPr>
           <p:nvPr>
-            <p:ph type="body" idx="1"/>
+            <p:ph type="body" sz="quarter" idx="3"/>
           </p:nvPr>
         </p:nvSpPr>
         <p:spPr/>
@@ -8429,7 +8992,9 @@
           <a:bodyPr/>
           <a:lstStyle/>
           <a:p>
-            <a:endParaRPr lang="en-US"/>
+            <a:r>
+              <a:t>This slide simplifies OAuth 2 into five core steps. The user authorizes the app, which gets a temporary code. The app exchanges that code for an access token, which it uses to access protected resources. When the token expires, a refresh token can renew access without requiring the user to log in again. This matches the abstract flow diagram on the Wikipedia page.</a:t>
+            </a:r>
           </a:p>
         </p:txBody>
       </p:sp>
@@ -8440,29 +9005,12 @@
             <a:spLocks noGrp="1"/>
           </p:cNvSpPr>
           <p:nvPr>
-            <p:ph type="sldNum" sz="quarter" idx="10"/>
+            <p:ph type="sldNum" sz="quarter" idx="5"/>
           </p:nvPr>
         </p:nvSpPr>
         <p:spPr/>
-        <p:txBody>
-          <a:bodyPr/>
-          <a:lstStyle/>
-          <a:p>
-            <a:fld id="{94566334-40D3-444A-87CD-672C33ED3DCC}" type="slidenum">
-              <a:rPr lang="en-US" smtClean="0"/>
-              <a:pPr/>
-              <a:t>37</a:t>
-            </a:fld>
-            <a:endParaRPr lang="en-US"/>
-          </a:p>
-        </p:txBody>
       </p:sp>
     </p:spTree>
-    <p:extLst>
-      <p:ext uri="{BB962C8B-B14F-4D97-AF65-F5344CB8AC3E}">
-        <p14:creationId xmlns:p14="http://schemas.microsoft.com/office/powerpoint/2010/main" val="2250015042"/>
-      </p:ext>
-    </p:extLst>
   </p:cSld>
   <p:clrMapOvr>
     <a:masterClrMapping/>
@@ -8514,7 +9062,7 @@
           <a:bodyPr/>
           <a:lstStyle/>
           <a:p>
-            <a:endParaRPr lang="en-US"/>
+            <a:endParaRPr lang="en-US" dirty="0"/>
           </a:p>
         </p:txBody>
       </p:sp>
@@ -8525,7 +9073,7 @@
             <a:spLocks noGrp="1"/>
           </p:cNvSpPr>
           <p:nvPr>
-            <p:ph type="sldNum" sz="quarter" idx="10"/>
+            <p:ph type="sldNum" sz="quarter" idx="5"/>
           </p:nvPr>
         </p:nvSpPr>
         <p:spPr/>
@@ -8533,10 +9081,10 @@
           <a:bodyPr/>
           <a:lstStyle/>
           <a:p>
-            <a:fld id="{94566334-40D3-444A-87CD-672C33ED3DCC}" type="slidenum">
+            <a:fld id="{E4EDBFAA-E3FF-41DC-96EC-6BC8A2B7A07F}" type="slidenum">
               <a:rPr lang="en-US" smtClean="0"/>
               <a:pPr/>
-              <a:t>40</a:t>
+              <a:t>34</a:t>
             </a:fld>
             <a:endParaRPr lang="en-US"/>
           </a:p>
@@ -8545,7 +9093,7 @@
     </p:spTree>
     <p:extLst>
       <p:ext uri="{BB962C8B-B14F-4D97-AF65-F5344CB8AC3E}">
-        <p14:creationId xmlns:p14="http://schemas.microsoft.com/office/powerpoint/2010/main" val="1993870691"/>
+        <p14:creationId xmlns:p14="http://schemas.microsoft.com/office/powerpoint/2010/main" val="1016426800"/>
       </p:ext>
     </p:extLst>
   </p:cSld>
@@ -8599,233 +9147,7 @@
           <a:bodyPr/>
           <a:lstStyle/>
           <a:p>
-            <a:r>
-              <a:rPr lang="en-US" dirty="0"/>
-              <a:t>VPN also used for anonymity.</a:t>
-            </a:r>
-          </a:p>
-          <a:p>
-            <a:endParaRPr lang="en-US" dirty="0"/>
-          </a:p>
-          <a:p>
-            <a:pPr marL="514350" indent="-514350">
-              <a:buFont typeface="+mj-lt"/>
-              <a:buAutoNum type="arabicPeriod"/>
-            </a:pPr>
-            <a:r>
-              <a:rPr lang="en-US" sz="2800" dirty="0"/>
-              <a:t>Client on laptop generates an IP packet</a:t>
-            </a:r>
-          </a:p>
-          <a:p>
-            <a:pPr lvl="1"/>
-            <a:r>
-              <a:rPr lang="en-US" sz="2400" dirty="0"/>
-              <a:t>Could be bound for intranet </a:t>
-            </a:r>
-            <a:r>
-              <a:rPr lang="en-US" sz="2400" u="sng" dirty="0"/>
-              <a:t>or</a:t>
-            </a:r>
-            <a:r>
-              <a:rPr lang="en-US" sz="2400" dirty="0"/>
-              <a:t> external destination</a:t>
-            </a:r>
-          </a:p>
-          <a:p>
-            <a:pPr lvl="1"/>
-            <a:r>
-              <a:rPr lang="en-US" sz="2400" dirty="0"/>
-              <a:t>VPN client </a:t>
-            </a:r>
-            <a:r>
-              <a:rPr lang="en-US" sz="2400" u="sng" dirty="0"/>
-              <a:t>securely encapsulates</a:t>
-            </a:r>
-            <a:r>
-              <a:rPr lang="en-US" sz="2400" dirty="0"/>
-              <a:t> it in another IP packet </a:t>
-            </a:r>
-          </a:p>
-          <a:p>
-            <a:pPr lvl="1"/>
-            <a:r>
-              <a:rPr lang="en-US" sz="2400" dirty="0"/>
-              <a:t>Outer packet: </a:t>
-            </a:r>
-            <a:r>
-              <a:rPr lang="en-US" sz="2400" dirty="0" err="1"/>
-              <a:t>src</a:t>
-            </a:r>
-            <a:r>
-              <a:rPr lang="en-US" sz="2400" dirty="0"/>
-              <a:t> = </a:t>
-            </a:r>
-            <a:r>
-              <a:rPr lang="en-US" sz="2400" dirty="0">
-                <a:solidFill>
-                  <a:srgbClr val="00B050"/>
-                </a:solidFill>
-              </a:rPr>
-              <a:t>55.66.77.88</a:t>
-            </a:r>
-            <a:r>
-              <a:rPr lang="en-US" sz="2400" dirty="0"/>
-              <a:t>; </a:t>
-            </a:r>
-            <a:r>
-              <a:rPr lang="en-US" sz="2400" dirty="0" err="1"/>
-              <a:t>dst</a:t>
-            </a:r>
-            <a:r>
-              <a:rPr lang="en-US" sz="2400" dirty="0"/>
-              <a:t> = </a:t>
-            </a:r>
-            <a:r>
-              <a:rPr lang="en-US" sz="2400" dirty="0">
-                <a:solidFill>
-                  <a:srgbClr val="00B050"/>
-                </a:solidFill>
-              </a:rPr>
-              <a:t>11.22.33.44</a:t>
-            </a:r>
-          </a:p>
-          <a:p>
-            <a:pPr lvl="1"/>
-            <a:r>
-              <a:rPr lang="en-US" sz="2400" dirty="0"/>
-              <a:t>Inner packet: </a:t>
-            </a:r>
-            <a:r>
-              <a:rPr lang="en-US" sz="2400" dirty="0" err="1"/>
-              <a:t>src</a:t>
-            </a:r>
-            <a:r>
-              <a:rPr lang="en-US" sz="2400" dirty="0"/>
-              <a:t> = </a:t>
-            </a:r>
-            <a:r>
-              <a:rPr lang="en-US" sz="2400" dirty="0">
-                <a:solidFill>
-                  <a:srgbClr val="FF0000"/>
-                </a:solidFill>
-              </a:rPr>
-              <a:t>192.168.1.50</a:t>
-            </a:r>
-            <a:r>
-              <a:rPr lang="en-US" sz="2400" dirty="0"/>
-              <a:t>; </a:t>
-            </a:r>
-            <a:r>
-              <a:rPr lang="en-US" sz="2400" dirty="0" err="1"/>
-              <a:t>dst</a:t>
-            </a:r>
-            <a:r>
-              <a:rPr lang="en-US" sz="2400" dirty="0"/>
-              <a:t> = whatever</a:t>
-            </a:r>
-          </a:p>
-          <a:p>
-            <a:pPr marL="514350" indent="-514350">
-              <a:buFont typeface="+mj-lt"/>
-              <a:buAutoNum type="arabicPeriod"/>
-            </a:pPr>
-            <a:r>
-              <a:rPr lang="en-US" sz="2800" dirty="0"/>
-              <a:t>VPN server decrypts outer packet, forwards inner packet</a:t>
-            </a:r>
-          </a:p>
-          <a:p>
-            <a:pPr marL="514350" indent="-514350">
-              <a:buFont typeface="+mj-lt"/>
-              <a:buAutoNum type="arabicPeriod"/>
-            </a:pPr>
-            <a:r>
-              <a:rPr lang="en-US" sz="2800" dirty="0"/>
-              <a:t>Receives a response addressed to </a:t>
-            </a:r>
-            <a:r>
-              <a:rPr lang="en-US" sz="2800" dirty="0">
-                <a:solidFill>
-                  <a:srgbClr val="FF0000"/>
-                </a:solidFill>
-              </a:rPr>
-              <a:t>192.168.1.50</a:t>
-            </a:r>
-            <a:endParaRPr lang="en-US" sz="2800" dirty="0"/>
-          </a:p>
-          <a:p>
-            <a:pPr lvl="1"/>
-            <a:r>
-              <a:rPr lang="en-US" sz="2400" dirty="0"/>
-              <a:t>Looks at routing table, realizes this is via VPN</a:t>
-            </a:r>
-          </a:p>
-          <a:p>
-            <a:pPr lvl="1"/>
-            <a:r>
-              <a:rPr lang="en-US" sz="2400" dirty="0"/>
-              <a:t>Encapsulates it in an outer packet with </a:t>
-            </a:r>
-            <a:br>
-              <a:rPr lang="en-US" sz="2400" dirty="0"/>
-            </a:br>
-            <a:r>
-              <a:rPr lang="en-US" sz="2400" dirty="0" err="1"/>
-              <a:t>src</a:t>
-            </a:r>
-            <a:r>
-              <a:rPr lang="en-US" sz="2400" dirty="0"/>
-              <a:t> = whatever, </a:t>
-            </a:r>
-            <a:r>
-              <a:rPr lang="en-US" sz="2400" dirty="0" err="1"/>
-              <a:t>dst</a:t>
-            </a:r>
-            <a:r>
-              <a:rPr lang="en-US" sz="2400" dirty="0"/>
-              <a:t> = </a:t>
-            </a:r>
-            <a:r>
-              <a:rPr lang="en-US" sz="2400" dirty="0">
-                <a:solidFill>
-                  <a:srgbClr val="00B050"/>
-                </a:solidFill>
-              </a:rPr>
-              <a:t>55.66.77.88 </a:t>
-            </a:r>
-            <a:r>
-              <a:rPr lang="en-US" sz="2400" dirty="0"/>
-              <a:t>and forwards it</a:t>
-            </a:r>
-          </a:p>
-          <a:p>
-            <a:pPr marL="514350" indent="-514350">
-              <a:buFont typeface="+mj-lt"/>
-              <a:buAutoNum type="arabicPeriod"/>
-            </a:pPr>
-            <a:r>
-              <a:rPr lang="en-US" sz="2800" dirty="0"/>
-              <a:t>VPN client decrypts outer packet, passes on inner packet to application software</a:t>
-            </a:r>
-          </a:p>
-          <a:p>
-            <a:pPr marL="0" indent="0">
-              <a:buNone/>
-            </a:pPr>
-            <a:endParaRPr lang="en-US" sz="2800" dirty="0"/>
-          </a:p>
-          <a:p>
-            <a:pPr marL="0" indent="0">
-              <a:buNone/>
-            </a:pPr>
-            <a:r>
-              <a:rPr lang="en-US" sz="2800" dirty="0"/>
-              <a:t>Result: client applications think and act as if they are on Intranet</a:t>
-            </a:r>
-          </a:p>
-          <a:p>
-            <a:endParaRPr lang="en-US" dirty="0"/>
+            <a:endParaRPr lang="en-US"/>
           </a:p>
         </p:txBody>
       </p:sp>
@@ -8847,7 +9169,7 @@
             <a:fld id="{94566334-40D3-444A-87CD-672C33ED3DCC}" type="slidenum">
               <a:rPr lang="en-US" smtClean="0"/>
               <a:pPr/>
-              <a:t>41</a:t>
+              <a:t>38</a:t>
             </a:fld>
             <a:endParaRPr lang="en-US"/>
           </a:p>
@@ -8856,7 +9178,7 @@
     </p:spTree>
     <p:extLst>
       <p:ext uri="{BB962C8B-B14F-4D97-AF65-F5344CB8AC3E}">
-        <p14:creationId xmlns:p14="http://schemas.microsoft.com/office/powerpoint/2010/main" val="421958965"/>
+        <p14:creationId xmlns:p14="http://schemas.microsoft.com/office/powerpoint/2010/main" val="2250015042"/>
       </p:ext>
     </p:extLst>
   </p:cSld>
@@ -8932,7 +9254,7 @@
             <a:fld id="{94566334-40D3-444A-87CD-672C33ED3DCC}" type="slidenum">
               <a:rPr lang="en-US" smtClean="0"/>
               <a:pPr/>
-              <a:t>42</a:t>
+              <a:t>41</a:t>
             </a:fld>
             <a:endParaRPr lang="en-US"/>
           </a:p>
@@ -8941,7 +9263,7 @@
     </p:spTree>
     <p:extLst>
       <p:ext uri="{BB962C8B-B14F-4D97-AF65-F5344CB8AC3E}">
-        <p14:creationId xmlns:p14="http://schemas.microsoft.com/office/powerpoint/2010/main" val="1240103099"/>
+        <p14:creationId xmlns:p14="http://schemas.microsoft.com/office/powerpoint/2010/main" val="1993870691"/>
       </p:ext>
     </p:extLst>
   </p:cSld>
@@ -8978,12 +9300,7 @@
             <p:ph type="sldImg"/>
           </p:nvPr>
         </p:nvSpPr>
-        <p:spPr>
-          <a:xfrm>
-            <a:off x="381000" y="685800"/>
-            <a:ext cx="6096000" cy="3429000"/>
-          </a:xfrm>
-        </p:spPr>
+        <p:spPr/>
       </p:sp>
       <p:sp>
         <p:nvSpPr>
@@ -9002,8 +9319,231 @@
           <a:p>
             <a:r>
               <a:rPr lang="en-US" dirty="0"/>
-              <a:t>Serious problem: Timesharing system</a:t>
-            </a:r>
+              <a:t>VPN also used for anonymity.</a:t>
+            </a:r>
+          </a:p>
+          <a:p>
+            <a:endParaRPr lang="en-US" dirty="0"/>
+          </a:p>
+          <a:p>
+            <a:pPr marL="514350" indent="-514350">
+              <a:buFont typeface="+mj-lt"/>
+              <a:buAutoNum type="arabicPeriod"/>
+            </a:pPr>
+            <a:r>
+              <a:rPr lang="en-US" sz="2800" dirty="0"/>
+              <a:t>Client on laptop generates an IP packet</a:t>
+            </a:r>
+          </a:p>
+          <a:p>
+            <a:pPr lvl="1"/>
+            <a:r>
+              <a:rPr lang="en-US" sz="2400" dirty="0"/>
+              <a:t>Could be bound for intranet </a:t>
+            </a:r>
+            <a:r>
+              <a:rPr lang="en-US" sz="2400" u="sng" dirty="0"/>
+              <a:t>or</a:t>
+            </a:r>
+            <a:r>
+              <a:rPr lang="en-US" sz="2400" dirty="0"/>
+              <a:t> external destination</a:t>
+            </a:r>
+          </a:p>
+          <a:p>
+            <a:pPr lvl="1"/>
+            <a:r>
+              <a:rPr lang="en-US" sz="2400" dirty="0"/>
+              <a:t>VPN client </a:t>
+            </a:r>
+            <a:r>
+              <a:rPr lang="en-US" sz="2400" u="sng" dirty="0"/>
+              <a:t>securely encapsulates</a:t>
+            </a:r>
+            <a:r>
+              <a:rPr lang="en-US" sz="2400" dirty="0"/>
+              <a:t> it in another IP packet </a:t>
+            </a:r>
+          </a:p>
+          <a:p>
+            <a:pPr lvl="1"/>
+            <a:r>
+              <a:rPr lang="en-US" sz="2400" dirty="0"/>
+              <a:t>Outer packet: </a:t>
+            </a:r>
+            <a:r>
+              <a:rPr lang="en-US" sz="2400" dirty="0" err="1"/>
+              <a:t>src</a:t>
+            </a:r>
+            <a:r>
+              <a:rPr lang="en-US" sz="2400" dirty="0"/>
+              <a:t> = </a:t>
+            </a:r>
+            <a:r>
+              <a:rPr lang="en-US" sz="2400" dirty="0">
+                <a:solidFill>
+                  <a:srgbClr val="00B050"/>
+                </a:solidFill>
+              </a:rPr>
+              <a:t>55.66.77.88</a:t>
+            </a:r>
+            <a:r>
+              <a:rPr lang="en-US" sz="2400" dirty="0"/>
+              <a:t>; </a:t>
+            </a:r>
+            <a:r>
+              <a:rPr lang="en-US" sz="2400" dirty="0" err="1"/>
+              <a:t>dst</a:t>
+            </a:r>
+            <a:r>
+              <a:rPr lang="en-US" sz="2400" dirty="0"/>
+              <a:t> = </a:t>
+            </a:r>
+            <a:r>
+              <a:rPr lang="en-US" sz="2400" dirty="0">
+                <a:solidFill>
+                  <a:srgbClr val="00B050"/>
+                </a:solidFill>
+              </a:rPr>
+              <a:t>11.22.33.44</a:t>
+            </a:r>
+          </a:p>
+          <a:p>
+            <a:pPr lvl="1"/>
+            <a:r>
+              <a:rPr lang="en-US" sz="2400" dirty="0"/>
+              <a:t>Inner packet: </a:t>
+            </a:r>
+            <a:r>
+              <a:rPr lang="en-US" sz="2400" dirty="0" err="1"/>
+              <a:t>src</a:t>
+            </a:r>
+            <a:r>
+              <a:rPr lang="en-US" sz="2400" dirty="0"/>
+              <a:t> = </a:t>
+            </a:r>
+            <a:r>
+              <a:rPr lang="en-US" sz="2400" dirty="0">
+                <a:solidFill>
+                  <a:srgbClr val="FF0000"/>
+                </a:solidFill>
+              </a:rPr>
+              <a:t>192.168.1.50</a:t>
+            </a:r>
+            <a:r>
+              <a:rPr lang="en-US" sz="2400" dirty="0"/>
+              <a:t>; </a:t>
+            </a:r>
+            <a:r>
+              <a:rPr lang="en-US" sz="2400" dirty="0" err="1"/>
+              <a:t>dst</a:t>
+            </a:r>
+            <a:r>
+              <a:rPr lang="en-US" sz="2400" dirty="0"/>
+              <a:t> = whatever</a:t>
+            </a:r>
+          </a:p>
+          <a:p>
+            <a:pPr marL="514350" indent="-514350">
+              <a:buFont typeface="+mj-lt"/>
+              <a:buAutoNum type="arabicPeriod"/>
+            </a:pPr>
+            <a:r>
+              <a:rPr lang="en-US" sz="2800" dirty="0"/>
+              <a:t>VPN server decrypts outer packet, forwards inner packet</a:t>
+            </a:r>
+          </a:p>
+          <a:p>
+            <a:pPr marL="514350" indent="-514350">
+              <a:buFont typeface="+mj-lt"/>
+              <a:buAutoNum type="arabicPeriod"/>
+            </a:pPr>
+            <a:r>
+              <a:rPr lang="en-US" sz="2800" dirty="0"/>
+              <a:t>Receives a response addressed to </a:t>
+            </a:r>
+            <a:r>
+              <a:rPr lang="en-US" sz="2800" dirty="0">
+                <a:solidFill>
+                  <a:srgbClr val="FF0000"/>
+                </a:solidFill>
+              </a:rPr>
+              <a:t>192.168.1.50</a:t>
+            </a:r>
+            <a:endParaRPr lang="en-US" sz="2800" dirty="0"/>
+          </a:p>
+          <a:p>
+            <a:pPr lvl="1"/>
+            <a:r>
+              <a:rPr lang="en-US" sz="2400" dirty="0"/>
+              <a:t>Looks at routing table, realizes this is via VPN</a:t>
+            </a:r>
+          </a:p>
+          <a:p>
+            <a:pPr lvl="1"/>
+            <a:r>
+              <a:rPr lang="en-US" sz="2400" dirty="0"/>
+              <a:t>Encapsulates it in an outer packet with </a:t>
+            </a:r>
+            <a:br>
+              <a:rPr lang="en-US" sz="2400" dirty="0"/>
+            </a:br>
+            <a:r>
+              <a:rPr lang="en-US" sz="2400" dirty="0" err="1"/>
+              <a:t>src</a:t>
+            </a:r>
+            <a:r>
+              <a:rPr lang="en-US" sz="2400" dirty="0"/>
+              <a:t> = whatever, </a:t>
+            </a:r>
+            <a:r>
+              <a:rPr lang="en-US" sz="2400" dirty="0" err="1"/>
+              <a:t>dst</a:t>
+            </a:r>
+            <a:r>
+              <a:rPr lang="en-US" sz="2400" dirty="0"/>
+              <a:t> = </a:t>
+            </a:r>
+            <a:r>
+              <a:rPr lang="en-US" sz="2400" dirty="0">
+                <a:solidFill>
+                  <a:srgbClr val="00B050"/>
+                </a:solidFill>
+              </a:rPr>
+              <a:t>55.66.77.88 </a:t>
+            </a:r>
+            <a:r>
+              <a:rPr lang="en-US" sz="2400" dirty="0"/>
+              <a:t>and forwards it</a:t>
+            </a:r>
+          </a:p>
+          <a:p>
+            <a:pPr marL="514350" indent="-514350">
+              <a:buFont typeface="+mj-lt"/>
+              <a:buAutoNum type="arabicPeriod"/>
+            </a:pPr>
+            <a:r>
+              <a:rPr lang="en-US" sz="2800" dirty="0"/>
+              <a:t>VPN client decrypts outer packet, passes on inner packet to application software</a:t>
+            </a:r>
+          </a:p>
+          <a:p>
+            <a:pPr marL="0" indent="0">
+              <a:buNone/>
+            </a:pPr>
+            <a:endParaRPr lang="en-US" sz="2800" dirty="0"/>
+          </a:p>
+          <a:p>
+            <a:pPr marL="0" indent="0">
+              <a:buNone/>
+            </a:pPr>
+            <a:r>
+              <a:rPr lang="en-US" sz="2800" dirty="0"/>
+              <a:t>Result: client applications think and act as if they are on Intranet</a:t>
+            </a:r>
+          </a:p>
+          <a:p>
+            <a:endParaRPr lang="en-US" dirty="0"/>
           </a:p>
         </p:txBody>
       </p:sp>
@@ -9022,10 +9562,10 @@
           <a:bodyPr/>
           <a:lstStyle/>
           <a:p>
-            <a:fld id="{E4EDBFAA-E3FF-41DC-96EC-6BC8A2B7A07F}" type="slidenum">
+            <a:fld id="{94566334-40D3-444A-87CD-672C33ED3DCC}" type="slidenum">
               <a:rPr lang="en-US" smtClean="0"/>
               <a:pPr/>
-              <a:t>45</a:t>
+              <a:t>42</a:t>
             </a:fld>
             <a:endParaRPr lang="en-US"/>
           </a:p>
@@ -9034,7 +9574,7 @@
     </p:spTree>
     <p:extLst>
       <p:ext uri="{BB962C8B-B14F-4D97-AF65-F5344CB8AC3E}">
-        <p14:creationId xmlns:p14="http://schemas.microsoft.com/office/powerpoint/2010/main" val="1793400768"/>
+        <p14:creationId xmlns:p14="http://schemas.microsoft.com/office/powerpoint/2010/main" val="421958965"/>
       </p:ext>
     </p:extLst>
   </p:cSld>
@@ -9071,12 +9611,7 @@
             <p:ph type="sldImg"/>
           </p:nvPr>
         </p:nvSpPr>
-        <p:spPr>
-          <a:xfrm>
-            <a:off x="381000" y="685800"/>
-            <a:ext cx="6096000" cy="3429000"/>
-          </a:xfrm>
-        </p:spPr>
+        <p:spPr/>
       </p:sp>
       <p:sp>
         <p:nvSpPr>
@@ -9093,7 +9628,7 @@
           <a:bodyPr/>
           <a:lstStyle/>
           <a:p>
-            <a:endParaRPr lang="en-US" dirty="0"/>
+            <a:endParaRPr lang="en-US"/>
           </a:p>
         </p:txBody>
       </p:sp>
@@ -9112,10 +9647,10 @@
           <a:bodyPr/>
           <a:lstStyle/>
           <a:p>
-            <a:fld id="{E4EDBFAA-E3FF-41DC-96EC-6BC8A2B7A07F}" type="slidenum">
+            <a:fld id="{94566334-40D3-444A-87CD-672C33ED3DCC}" type="slidenum">
               <a:rPr lang="en-US" smtClean="0"/>
               <a:pPr/>
-              <a:t>47</a:t>
+              <a:t>43</a:t>
             </a:fld>
             <a:endParaRPr lang="en-US"/>
           </a:p>
@@ -9124,7 +9659,7 @@
     </p:spTree>
     <p:extLst>
       <p:ext uri="{BB962C8B-B14F-4D97-AF65-F5344CB8AC3E}">
-        <p14:creationId xmlns:p14="http://schemas.microsoft.com/office/powerpoint/2010/main" val="1904088851"/>
+        <p14:creationId xmlns:p14="http://schemas.microsoft.com/office/powerpoint/2010/main" val="1240103099"/>
       </p:ext>
     </p:extLst>
   </p:cSld>
@@ -9185,32 +9720,8 @@
           <a:p>
             <a:r>
               <a:rPr lang="en-US" dirty="0"/>
-              <a:t>Opening a file involves checking</a:t>
-            </a:r>
-            <a:r>
-              <a:rPr lang="en-US" baseline="0" dirty="0"/>
-              <a:t> an</a:t>
-            </a:r>
-            <a:r>
-              <a:rPr lang="en-US" dirty="0"/>
-              <a:t> Access Control List</a:t>
-            </a:r>
-            <a:r>
-              <a:rPr lang="en-US" baseline="0" dirty="0"/>
-              <a:t> to see if the user has permission to open the file.</a:t>
-            </a:r>
-          </a:p>
-          <a:p>
-            <a:endParaRPr lang="en-US" baseline="0" dirty="0"/>
-          </a:p>
-          <a:p>
-            <a:r>
-              <a:rPr lang="en-US" baseline="0" dirty="0"/>
-              <a:t>Reading from the file involves checking a capability.</a:t>
-            </a:r>
-          </a:p>
-          <a:p>
-            <a:endParaRPr lang="en-US" dirty="0"/>
+              <a:t>Serious problem: Timesharing system</a:t>
+            </a:r>
           </a:p>
         </p:txBody>
       </p:sp>
@@ -9229,10 +9740,10 @@
           <a:bodyPr/>
           <a:lstStyle/>
           <a:p>
-            <a:fld id="{94566334-40D3-444A-87CD-672C33ED3DCC}" type="slidenum">
+            <a:fld id="{E4EDBFAA-E3FF-41DC-96EC-6BC8A2B7A07F}" type="slidenum">
               <a:rPr lang="en-US" smtClean="0"/>
               <a:pPr/>
-              <a:t>48</a:t>
+              <a:t>46</a:t>
             </a:fld>
             <a:endParaRPr lang="en-US"/>
           </a:p>
@@ -9241,7 +9752,7 @@
     </p:spTree>
     <p:extLst>
       <p:ext uri="{BB962C8B-B14F-4D97-AF65-F5344CB8AC3E}">
-        <p14:creationId xmlns:p14="http://schemas.microsoft.com/office/powerpoint/2010/main" val="804667765"/>
+        <p14:creationId xmlns:p14="http://schemas.microsoft.com/office/powerpoint/2010/main" val="1793400768"/>
       </p:ext>
     </p:extLst>
   </p:cSld>
@@ -9300,139 +9811,6 @@
           <a:bodyPr/>
           <a:lstStyle/>
           <a:p>
-            <a:pPr marL="0" marR="0" indent="0" algn="l" defTabSz="914400" rtl="0" eaLnBrk="1" fontAlgn="auto" latinLnBrk="0" hangingPunct="1">
-              <a:lnSpc>
-                <a:spcPct val="100000"/>
-              </a:lnSpc>
-              <a:spcBef>
-                <a:spcPts val="0"/>
-              </a:spcBef>
-              <a:spcAft>
-                <a:spcPts val="0"/>
-              </a:spcAft>
-              <a:buClrTx/>
-              <a:buSzTx/>
-              <a:buFontTx/>
-              <a:buNone/>
-              <a:tabLst/>
-              <a:defRPr/>
-            </a:pPr>
-            <a:r>
-              <a:rPr lang="en-US" dirty="0"/>
-              <a:t>A subject is a specific</a:t>
-            </a:r>
-            <a:r>
-              <a:rPr lang="en-US" baseline="0" dirty="0"/>
-              <a:t> </a:t>
-            </a:r>
-            <a:r>
-              <a:rPr lang="en-US" dirty="0"/>
-              <a:t>program acting on behalf</a:t>
-            </a:r>
-            <a:r>
-              <a:rPr lang="en-US" baseline="0" dirty="0"/>
-              <a:t> of a specific user.</a:t>
-            </a:r>
-            <a:endParaRPr lang="en-US" dirty="0"/>
-          </a:p>
-          <a:p>
-            <a:pPr marL="0" marR="0" indent="0" algn="l" defTabSz="914400" rtl="0" eaLnBrk="1" fontAlgn="auto" latinLnBrk="0" hangingPunct="1">
-              <a:lnSpc>
-                <a:spcPct val="100000"/>
-              </a:lnSpc>
-              <a:spcBef>
-                <a:spcPts val="0"/>
-              </a:spcBef>
-              <a:spcAft>
-                <a:spcPts val="0"/>
-              </a:spcAft>
-              <a:buClrTx/>
-              <a:buSzTx/>
-              <a:buFontTx/>
-              <a:buNone/>
-              <a:tabLst/>
-              <a:defRPr/>
-            </a:pPr>
-            <a:endParaRPr lang="en-US" dirty="0"/>
-          </a:p>
-          <a:p>
-            <a:pPr marL="0" marR="0" indent="0" algn="l" defTabSz="914400" rtl="0" eaLnBrk="1" fontAlgn="auto" latinLnBrk="0" hangingPunct="1">
-              <a:lnSpc>
-                <a:spcPct val="100000"/>
-              </a:lnSpc>
-              <a:spcBef>
-                <a:spcPts val="0"/>
-              </a:spcBef>
-              <a:spcAft>
-                <a:spcPts val="0"/>
-              </a:spcAft>
-              <a:buClrTx/>
-              <a:buSzTx/>
-              <a:buFontTx/>
-              <a:buNone/>
-              <a:tabLst/>
-              <a:defRPr/>
-            </a:pPr>
-            <a:r>
-              <a:rPr lang="en-US" dirty="0"/>
-              <a:t>Monitor</a:t>
-            </a:r>
-            <a:r>
-              <a:rPr lang="en-US" baseline="0" dirty="0"/>
-              <a:t> is typically the OS.</a:t>
-            </a:r>
-          </a:p>
-          <a:p>
-            <a:pPr marL="0" marR="0" indent="0" algn="l" defTabSz="914400" rtl="0" eaLnBrk="1" fontAlgn="auto" latinLnBrk="0" hangingPunct="1">
-              <a:lnSpc>
-                <a:spcPct val="100000"/>
-              </a:lnSpc>
-              <a:spcBef>
-                <a:spcPts val="0"/>
-              </a:spcBef>
-              <a:spcAft>
-                <a:spcPts val="0"/>
-              </a:spcAft>
-              <a:buClrTx/>
-              <a:buSzTx/>
-              <a:buFontTx/>
-              <a:buNone/>
-              <a:tabLst/>
-              <a:defRPr/>
-            </a:pPr>
-            <a:endParaRPr lang="en-US" baseline="0" dirty="0"/>
-          </a:p>
-          <a:p>
-            <a:pPr marL="0" marR="0" indent="0" algn="l" defTabSz="914400" rtl="0" eaLnBrk="1" fontAlgn="auto" latinLnBrk="0" hangingPunct="1">
-              <a:lnSpc>
-                <a:spcPct val="100000"/>
-              </a:lnSpc>
-              <a:spcBef>
-                <a:spcPts val="0"/>
-              </a:spcBef>
-              <a:spcAft>
-                <a:spcPts val="0"/>
-              </a:spcAft>
-              <a:buClrTx/>
-              <a:buSzTx/>
-              <a:buFontTx/>
-              <a:buNone/>
-              <a:tabLst/>
-              <a:defRPr/>
-            </a:pPr>
-            <a:r>
-              <a:rPr lang="en-US" dirty="0"/>
-              <a:t>Policy specifies (subject, verb, object) triples.</a:t>
-            </a:r>
-            <a:r>
-              <a:rPr lang="en-US" baseline="0" dirty="0"/>
-              <a:t> Answers the question can User U running Program P perform Action A on Resource R?</a:t>
-            </a:r>
-          </a:p>
-          <a:p>
-            <a:endParaRPr lang="en-US" dirty="0"/>
-          </a:p>
-          <a:p>
             <a:endParaRPr lang="en-US" dirty="0"/>
           </a:p>
         </p:txBody>
@@ -9452,10 +9830,10 @@
           <a:bodyPr/>
           <a:lstStyle/>
           <a:p>
-            <a:fld id="{94566334-40D3-444A-87CD-672C33ED3DCC}" type="slidenum">
+            <a:fld id="{E4EDBFAA-E3FF-41DC-96EC-6BC8A2B7A07F}" type="slidenum">
               <a:rPr lang="en-US" smtClean="0"/>
               <a:pPr/>
-              <a:t>49</a:t>
+              <a:t>48</a:t>
             </a:fld>
             <a:endParaRPr lang="en-US"/>
           </a:p>
@@ -9464,7 +9842,7 @@
     </p:spTree>
     <p:extLst>
       <p:ext uri="{BB962C8B-B14F-4D97-AF65-F5344CB8AC3E}">
-        <p14:creationId xmlns:p14="http://schemas.microsoft.com/office/powerpoint/2010/main" val="843810027"/>
+        <p14:creationId xmlns:p14="http://schemas.microsoft.com/office/powerpoint/2010/main" val="1904088851"/>
       </p:ext>
     </p:extLst>
   </p:cSld>
@@ -9525,11 +9903,19 @@
           <a:p>
             <a:r>
               <a:rPr lang="en-US" dirty="0"/>
-              <a:t>At every instance of time, each process runs in some protection domain. Processes can switch between</a:t>
+              <a:t>Opening a file involves checking</a:t>
             </a:r>
             <a:r>
               <a:rPr lang="en-US" baseline="0" dirty="0"/>
-              <a:t> domains during execution; the rules for domain switching depend a lot on the system.</a:t>
+              <a:t> an</a:t>
+            </a:r>
+            <a:r>
+              <a:rPr lang="en-US" dirty="0"/>
+              <a:t> Access Control List</a:t>
+            </a:r>
+            <a:r>
+              <a:rPr lang="en-US" baseline="0" dirty="0"/>
+              <a:t> to see if the user has permission to open the file.</a:t>
             </a:r>
           </a:p>
           <a:p>
@@ -9538,8 +9924,10 @@
           <a:p>
             <a:r>
               <a:rPr lang="en-US" baseline="0" dirty="0"/>
-              <a:t>“Rights” == “Verb” in our notes here.</a:t>
-            </a:r>
+              <a:t>Reading from the file involves checking a capability.</a:t>
+            </a:r>
+          </a:p>
+          <a:p>
             <a:endParaRPr lang="en-US" dirty="0"/>
           </a:p>
         </p:txBody>
@@ -9559,10 +9947,10 @@
           <a:bodyPr/>
           <a:lstStyle/>
           <a:p>
-            <a:fld id="{E4EDBFAA-E3FF-41DC-96EC-6BC8A2B7A07F}" type="slidenum">
+            <a:fld id="{94566334-40D3-444A-87CD-672C33ED3DCC}" type="slidenum">
               <a:rPr lang="en-US" smtClean="0"/>
               <a:pPr/>
-              <a:t>50</a:t>
+              <a:t>49</a:t>
             </a:fld>
             <a:endParaRPr lang="en-US"/>
           </a:p>
@@ -9571,7 +9959,7 @@
     </p:spTree>
     <p:extLst>
       <p:ext uri="{BB962C8B-B14F-4D97-AF65-F5344CB8AC3E}">
-        <p14:creationId xmlns:p14="http://schemas.microsoft.com/office/powerpoint/2010/main" val="3715266462"/>
+        <p14:creationId xmlns:p14="http://schemas.microsoft.com/office/powerpoint/2010/main" val="804667765"/>
       </p:ext>
     </p:extLst>
   </p:cSld>
@@ -9630,23 +10018,139 @@
           <a:bodyPr/>
           <a:lstStyle/>
           <a:p>
+            <a:pPr marL="0" marR="0" indent="0" algn="l" defTabSz="914400" rtl="0" eaLnBrk="1" fontAlgn="auto" latinLnBrk="0" hangingPunct="1">
+              <a:lnSpc>
+                <a:spcPct val="100000"/>
+              </a:lnSpc>
+              <a:spcBef>
+                <a:spcPts val="0"/>
+              </a:spcBef>
+              <a:spcAft>
+                <a:spcPts val="0"/>
+              </a:spcAft>
+              <a:buClrTx/>
+              <a:buSzTx/>
+              <a:buFontTx/>
+              <a:buNone/>
+              <a:tabLst/>
+              <a:defRPr/>
+            </a:pPr>
             <a:r>
               <a:rPr lang="en-US" dirty="0"/>
-              <a:t>The matrix of all possible (subject, verb, object) triples may be too big to store, but you can store only the list of allowed triples. </a:t>
-            </a:r>
-          </a:p>
-          <a:p>
+              <a:t>A subject is a specific</a:t>
+            </a:r>
+            <a:r>
+              <a:rPr lang="en-US" baseline="0" dirty="0"/>
+              <a:t> </a:t>
+            </a:r>
+            <a:r>
+              <a:rPr lang="en-US" dirty="0"/>
+              <a:t>program acting on behalf</a:t>
+            </a:r>
+            <a:r>
+              <a:rPr lang="en-US" baseline="0" dirty="0"/>
+              <a:t> of a specific user.</a:t>
+            </a:r>
             <a:endParaRPr lang="en-US" dirty="0"/>
           </a:p>
           <a:p>
+            <a:pPr marL="0" marR="0" indent="0" algn="l" defTabSz="914400" rtl="0" eaLnBrk="1" fontAlgn="auto" latinLnBrk="0" hangingPunct="1">
+              <a:lnSpc>
+                <a:spcPct val="100000"/>
+              </a:lnSpc>
+              <a:spcBef>
+                <a:spcPts val="0"/>
+              </a:spcBef>
+              <a:spcAft>
+                <a:spcPts val="0"/>
+              </a:spcAft>
+              <a:buClrTx/>
+              <a:buSzTx/>
+              <a:buFontTx/>
+              <a:buNone/>
+              <a:tabLst/>
+              <a:defRPr/>
+            </a:pPr>
+            <a:endParaRPr lang="en-US" dirty="0"/>
+          </a:p>
+          <a:p>
+            <a:pPr marL="0" marR="0" indent="0" algn="l" defTabSz="914400" rtl="0" eaLnBrk="1" fontAlgn="auto" latinLnBrk="0" hangingPunct="1">
+              <a:lnSpc>
+                <a:spcPct val="100000"/>
+              </a:lnSpc>
+              <a:spcBef>
+                <a:spcPts val="0"/>
+              </a:spcBef>
+              <a:spcAft>
+                <a:spcPts val="0"/>
+              </a:spcAft>
+              <a:buClrTx/>
+              <a:buSzTx/>
+              <a:buFontTx/>
+              <a:buNone/>
+              <a:tabLst/>
+              <a:defRPr/>
+            </a:pPr>
             <a:r>
               <a:rPr lang="en-US" dirty="0"/>
-              <a:t>For example, on Google docs there may be millions of users</a:t>
+              <a:t>Monitor</a:t>
             </a:r>
             <a:r>
               <a:rPr lang="en-US" baseline="0" dirty="0"/>
-              <a:t> and millions of documents, so Google can’t store it as a matrix, but each user has access to only a few tens to hundreds of documents, so they can store it as a list.</a:t>
-            </a:r>
+              <a:t> is typically the OS.</a:t>
+            </a:r>
+          </a:p>
+          <a:p>
+            <a:pPr marL="0" marR="0" indent="0" algn="l" defTabSz="914400" rtl="0" eaLnBrk="1" fontAlgn="auto" latinLnBrk="0" hangingPunct="1">
+              <a:lnSpc>
+                <a:spcPct val="100000"/>
+              </a:lnSpc>
+              <a:spcBef>
+                <a:spcPts val="0"/>
+              </a:spcBef>
+              <a:spcAft>
+                <a:spcPts val="0"/>
+              </a:spcAft>
+              <a:buClrTx/>
+              <a:buSzTx/>
+              <a:buFontTx/>
+              <a:buNone/>
+              <a:tabLst/>
+              <a:defRPr/>
+            </a:pPr>
+            <a:endParaRPr lang="en-US" baseline="0" dirty="0"/>
+          </a:p>
+          <a:p>
+            <a:pPr marL="0" marR="0" indent="0" algn="l" defTabSz="914400" rtl="0" eaLnBrk="1" fontAlgn="auto" latinLnBrk="0" hangingPunct="1">
+              <a:lnSpc>
+                <a:spcPct val="100000"/>
+              </a:lnSpc>
+              <a:spcBef>
+                <a:spcPts val="0"/>
+              </a:spcBef>
+              <a:spcAft>
+                <a:spcPts val="0"/>
+              </a:spcAft>
+              <a:buClrTx/>
+              <a:buSzTx/>
+              <a:buFontTx/>
+              <a:buNone/>
+              <a:tabLst/>
+              <a:defRPr/>
+            </a:pPr>
+            <a:r>
+              <a:rPr lang="en-US" dirty="0"/>
+              <a:t>Policy specifies (subject, verb, object) triples.</a:t>
+            </a:r>
+            <a:r>
+              <a:rPr lang="en-US" baseline="0" dirty="0"/>
+              <a:t> Answers the question can User U running Program P perform Action A on Resource R?</a:t>
+            </a:r>
+          </a:p>
+          <a:p>
+            <a:endParaRPr lang="en-US" dirty="0"/>
+          </a:p>
+          <a:p>
             <a:endParaRPr lang="en-US" dirty="0"/>
           </a:p>
         </p:txBody>
@@ -9669,7 +10173,7 @@
             <a:fld id="{94566334-40D3-444A-87CD-672C33ED3DCC}" type="slidenum">
               <a:rPr lang="en-US" smtClean="0"/>
               <a:pPr/>
-              <a:t>51</a:t>
+              <a:t>50</a:t>
             </a:fld>
             <a:endParaRPr lang="en-US"/>
           </a:p>
@@ -9678,7 +10182,7 @@
     </p:spTree>
     <p:extLst>
       <p:ext uri="{BB962C8B-B14F-4D97-AF65-F5344CB8AC3E}">
-        <p14:creationId xmlns:p14="http://schemas.microsoft.com/office/powerpoint/2010/main" val="2720620172"/>
+        <p14:creationId xmlns:p14="http://schemas.microsoft.com/office/powerpoint/2010/main" val="843810027"/>
       </p:ext>
     </p:extLst>
   </p:cSld>
@@ -9848,8 +10352,22 @@
           <a:p>
             <a:r>
               <a:rPr lang="en-US" dirty="0"/>
-              <a:t>Think about apps on your phone. You don’t want to mentally keep track of which data each app has access to.</a:t>
-            </a:r>
+              <a:t>At every instance of time, each process runs in some protection domain. Processes can switch between</a:t>
+            </a:r>
+            <a:r>
+              <a:rPr lang="en-US" baseline="0" dirty="0"/>
+              <a:t> domains during execution; the rules for domain switching depend a lot on the system.</a:t>
+            </a:r>
+          </a:p>
+          <a:p>
+            <a:endParaRPr lang="en-US" baseline="0" dirty="0"/>
+          </a:p>
+          <a:p>
+            <a:r>
+              <a:rPr lang="en-US" baseline="0" dirty="0"/>
+              <a:t>“Rights” == “Verb” in our notes here.</a:t>
+            </a:r>
+            <a:endParaRPr lang="en-US" dirty="0"/>
           </a:p>
         </p:txBody>
       </p:sp>
@@ -9868,10 +10386,10 @@
           <a:bodyPr/>
           <a:lstStyle/>
           <a:p>
-            <a:fld id="{94566334-40D3-444A-87CD-672C33ED3DCC}" type="slidenum">
+            <a:fld id="{E4EDBFAA-E3FF-41DC-96EC-6BC8A2B7A07F}" type="slidenum">
               <a:rPr lang="en-US" smtClean="0"/>
               <a:pPr/>
-              <a:t>52</a:t>
+              <a:t>51</a:t>
             </a:fld>
             <a:endParaRPr lang="en-US"/>
           </a:p>
@@ -9880,7 +10398,7 @@
     </p:spTree>
     <p:extLst>
       <p:ext uri="{BB962C8B-B14F-4D97-AF65-F5344CB8AC3E}">
-        <p14:creationId xmlns:p14="http://schemas.microsoft.com/office/powerpoint/2010/main" val="2900555317"/>
+        <p14:creationId xmlns:p14="http://schemas.microsoft.com/office/powerpoint/2010/main" val="3715266462"/>
       </p:ext>
     </p:extLst>
   </p:cSld>
@@ -9941,63 +10459,20 @@
           <a:p>
             <a:r>
               <a:rPr lang="en-US" dirty="0"/>
-              <a:t>This is the</a:t>
+              <a:t>The matrix of all possible (subject, verb, object) triples may be too big to store, but you can store only the list of allowed triples. </a:t>
+            </a:r>
+          </a:p>
+          <a:p>
+            <a:endParaRPr lang="en-US" dirty="0"/>
+          </a:p>
+          <a:p>
+            <a:r>
+              <a:rPr lang="en-US" dirty="0"/>
+              <a:t>For example, on Google docs there may be millions of users</a:t>
             </a:r>
             <a:r>
               <a:rPr lang="en-US" baseline="0" dirty="0"/>
-              <a:t> iOS model. </a:t>
-            </a:r>
-          </a:p>
-          <a:p>
-            <a:endParaRPr lang="en-US" dirty="0"/>
-          </a:p>
-          <a:p>
-            <a:r>
-              <a:rPr lang="en-US" dirty="0"/>
-              <a:t>Why would Uber want to access your camera? It needs it if you want it to automatically scan your credit card instead of typing in the number.</a:t>
-            </a:r>
-          </a:p>
-          <a:p>
-            <a:endParaRPr lang="en-US" dirty="0"/>
-          </a:p>
-          <a:p>
-            <a:r>
-              <a:rPr lang="en-US" dirty="0"/>
-              <a:t>This iOS-style</a:t>
-            </a:r>
-            <a:r>
-              <a:rPr lang="en-US" baseline="0" dirty="0"/>
-              <a:t> </a:t>
-            </a:r>
-            <a:r>
-              <a:rPr lang="en-US" dirty="0"/>
-              <a:t>prompt has several advantages</a:t>
-            </a:r>
-            <a:r>
-              <a:rPr lang="en-US" baseline="0" dirty="0"/>
-              <a:t> over the Android model</a:t>
-            </a:r>
-            <a:r>
-              <a:rPr lang="en-US" dirty="0"/>
-              <a:t>. If you stuck the</a:t>
-            </a:r>
-            <a:r>
-              <a:rPr lang="en-US" baseline="0" dirty="0"/>
-              <a:t> camera permission in the app-installation screen, most users would pay no attention; those that did would be confused and annoyed because it’s not obvious why Uber should need your camera. Besides, the prompt allows you to give access only when it’s actually needed, rather than all the time.</a:t>
-            </a:r>
-            <a:endParaRPr lang="en-US" dirty="0"/>
-          </a:p>
-          <a:p>
-            <a:endParaRPr lang="en-US" dirty="0"/>
-          </a:p>
-          <a:p>
-            <a:r>
-              <a:rPr lang="en-US" dirty="0"/>
-              <a:t>We can go farther and combine the user’s request for an action with the granting of the corresponding</a:t>
-            </a:r>
-            <a:r>
-              <a:rPr lang="en-US" baseline="0" dirty="0"/>
-              <a:t> permission in a single button. This has been proposed but not yet implemented in mainstream OSes http://research.microsoft.com/pubs/152495/user-driven-access-control-nov2011.pdf</a:t>
+              <a:t> and millions of documents, so Google can’t store it as a matrix, but each user has access to only a few tens to hundreds of documents, so they can store it as a list.</a:t>
             </a:r>
             <a:endParaRPr lang="en-US" dirty="0"/>
           </a:p>
@@ -10021,7 +10496,7 @@
             <a:fld id="{94566334-40D3-444A-87CD-672C33ED3DCC}" type="slidenum">
               <a:rPr lang="en-US" smtClean="0"/>
               <a:pPr/>
-              <a:t>53</a:t>
+              <a:t>52</a:t>
             </a:fld>
             <a:endParaRPr lang="en-US"/>
           </a:p>
@@ -10030,7 +10505,7 @@
     </p:spTree>
     <p:extLst>
       <p:ext uri="{BB962C8B-B14F-4D97-AF65-F5344CB8AC3E}">
-        <p14:creationId xmlns:p14="http://schemas.microsoft.com/office/powerpoint/2010/main" val="416344775"/>
+        <p14:creationId xmlns:p14="http://schemas.microsoft.com/office/powerpoint/2010/main" val="2720620172"/>
       </p:ext>
     </p:extLst>
   </p:cSld>
@@ -10089,7 +10564,10 @@
           <a:bodyPr/>
           <a:lstStyle/>
           <a:p>
-            <a:endParaRPr lang="en-US"/>
+            <a:r>
+              <a:rPr lang="en-US" dirty="0"/>
+              <a:t>Think about apps on your phone. You don’t want to mentally keep track of which data each app has access to.</a:t>
+            </a:r>
           </a:p>
         </p:txBody>
       </p:sp>
@@ -10111,7 +10589,7 @@
             <a:fld id="{94566334-40D3-444A-87CD-672C33ED3DCC}" type="slidenum">
               <a:rPr lang="en-US" smtClean="0"/>
               <a:pPr/>
-              <a:t>55</a:t>
+              <a:t>53</a:t>
             </a:fld>
             <a:endParaRPr lang="en-US"/>
           </a:p>
@@ -10120,7 +10598,7 @@
     </p:spTree>
     <p:extLst>
       <p:ext uri="{BB962C8B-B14F-4D97-AF65-F5344CB8AC3E}">
-        <p14:creationId xmlns:p14="http://schemas.microsoft.com/office/powerpoint/2010/main" val="4074729673"/>
+        <p14:creationId xmlns:p14="http://schemas.microsoft.com/office/powerpoint/2010/main" val="2900555317"/>
       </p:ext>
     </p:extLst>
   </p:cSld>
@@ -10181,20 +10659,63 @@
           <a:p>
             <a:r>
               <a:rPr lang="en-US" dirty="0"/>
-              <a:t>This is</a:t>
+              <a:t>This is the</a:t>
             </a:r>
             <a:r>
               <a:rPr lang="en-US" baseline="0" dirty="0"/>
-              <a:t> one way to simplify access control, in the military context.</a:t>
-            </a:r>
-          </a:p>
-          <a:p>
-            <a:endParaRPr lang="en-US" baseline="0" dirty="0"/>
-          </a:p>
-          <a:p>
+              <a:t> iOS model. </a:t>
+            </a:r>
+          </a:p>
+          <a:p>
+            <a:endParaRPr lang="en-US" dirty="0"/>
+          </a:p>
+          <a:p>
+            <a:r>
+              <a:rPr lang="en-US" dirty="0"/>
+              <a:t>Why would Uber want to access your camera? It needs it if you want it to automatically scan your credit card instead of typing in the number.</a:t>
+            </a:r>
+          </a:p>
+          <a:p>
+            <a:endParaRPr lang="en-US" dirty="0"/>
+          </a:p>
+          <a:p>
+            <a:r>
+              <a:rPr lang="en-US" dirty="0"/>
+              <a:t>This iOS-style</a:t>
+            </a:r>
             <a:r>
               <a:rPr lang="en-US" baseline="0" dirty="0"/>
-              <a:t>You can’t read above your clearance level, or write below it.  You can transfer information from a higher to a lower-level document in special cases, for example, declassification.</a:t>
+              <a:t> </a:t>
+            </a:r>
+            <a:r>
+              <a:rPr lang="en-US" dirty="0"/>
+              <a:t>prompt has several advantages</a:t>
+            </a:r>
+            <a:r>
+              <a:rPr lang="en-US" baseline="0" dirty="0"/>
+              <a:t> over the Android model</a:t>
+            </a:r>
+            <a:r>
+              <a:rPr lang="en-US" dirty="0"/>
+              <a:t>. If you stuck the</a:t>
+            </a:r>
+            <a:r>
+              <a:rPr lang="en-US" baseline="0" dirty="0"/>
+              <a:t> camera permission in the app-installation screen, most users would pay no attention; those that did would be confused and annoyed because it’s not obvious why Uber should need your camera. Besides, the prompt allows you to give access only when it’s actually needed, rather than all the time.</a:t>
+            </a:r>
+            <a:endParaRPr lang="en-US" dirty="0"/>
+          </a:p>
+          <a:p>
+            <a:endParaRPr lang="en-US" dirty="0"/>
+          </a:p>
+          <a:p>
+            <a:r>
+              <a:rPr lang="en-US" dirty="0"/>
+              <a:t>We can go farther and combine the user’s request for an action with the granting of the corresponding</a:t>
+            </a:r>
+            <a:r>
+              <a:rPr lang="en-US" baseline="0" dirty="0"/>
+              <a:t> permission in a single button. This has been proposed but not yet implemented in mainstream OSes http://research.microsoft.com/pubs/152495/user-driven-access-control-nov2011.pdf</a:t>
             </a:r>
             <a:endParaRPr lang="en-US" dirty="0"/>
           </a:p>
@@ -10218,7 +10739,7 @@
             <a:fld id="{94566334-40D3-444A-87CD-672C33ED3DCC}" type="slidenum">
               <a:rPr lang="en-US" smtClean="0"/>
               <a:pPr/>
-              <a:t>56</a:t>
+              <a:t>54</a:t>
             </a:fld>
             <a:endParaRPr lang="en-US"/>
           </a:p>
@@ -10227,7 +10748,7 @@
     </p:spTree>
     <p:extLst>
       <p:ext uri="{BB962C8B-B14F-4D97-AF65-F5344CB8AC3E}">
-        <p14:creationId xmlns:p14="http://schemas.microsoft.com/office/powerpoint/2010/main" val="590441656"/>
+        <p14:creationId xmlns:p14="http://schemas.microsoft.com/office/powerpoint/2010/main" val="416344775"/>
       </p:ext>
     </p:extLst>
   </p:cSld>
@@ -10286,13 +10807,103 @@
           <a:bodyPr/>
           <a:lstStyle/>
           <a:p>
+            <a:endParaRPr lang="en-US"/>
+          </a:p>
+        </p:txBody>
+      </p:sp>
+      <p:sp>
+        <p:nvSpPr>
+          <p:cNvPr id="4" name="Slide Number Placeholder 3"/>
+          <p:cNvSpPr>
+            <a:spLocks noGrp="1"/>
+          </p:cNvSpPr>
+          <p:nvPr>
+            <p:ph type="sldNum" sz="quarter" idx="10"/>
+          </p:nvPr>
+        </p:nvSpPr>
+        <p:spPr/>
+        <p:txBody>
+          <a:bodyPr/>
+          <a:lstStyle/>
+          <a:p>
+            <a:fld id="{94566334-40D3-444A-87CD-672C33ED3DCC}" type="slidenum">
+              <a:rPr lang="en-US" smtClean="0"/>
+              <a:pPr/>
+              <a:t>56</a:t>
+            </a:fld>
+            <a:endParaRPr lang="en-US"/>
+          </a:p>
+        </p:txBody>
+      </p:sp>
+    </p:spTree>
+    <p:extLst>
+      <p:ext uri="{BB962C8B-B14F-4D97-AF65-F5344CB8AC3E}">
+        <p14:creationId xmlns:p14="http://schemas.microsoft.com/office/powerpoint/2010/main" val="4074729673"/>
+      </p:ext>
+    </p:extLst>
+  </p:cSld>
+  <p:clrMapOvr>
+    <a:masterClrMapping/>
+  </p:clrMapOvr>
+</p:notes>
+</file>
+
+<file path=ppt/notesSlides/notesSlide45.xml><?xml version="1.0" encoding="utf-8"?>
+<p:notes xmlns:a="http://schemas.openxmlformats.org/drawingml/2006/main" xmlns:r="http://schemas.openxmlformats.org/officeDocument/2006/relationships" xmlns:p="http://schemas.openxmlformats.org/presentationml/2006/main">
+  <p:cSld>
+    <p:spTree>
+      <p:nvGrpSpPr>
+        <p:cNvPr id="1" name=""/>
+        <p:cNvGrpSpPr/>
+        <p:nvPr/>
+      </p:nvGrpSpPr>
+      <p:grpSpPr>
+        <a:xfrm>
+          <a:off x="0" y="0"/>
+          <a:ext cx="0" cy="0"/>
+          <a:chOff x="0" y="0"/>
+          <a:chExt cx="0" cy="0"/>
+        </a:xfrm>
+      </p:grpSpPr>
+      <p:sp>
+        <p:nvSpPr>
+          <p:cNvPr id="2" name="Slide Image Placeholder 1"/>
+          <p:cNvSpPr>
+            <a:spLocks noGrp="1" noRot="1" noChangeAspect="1"/>
+          </p:cNvSpPr>
+          <p:nvPr>
+            <p:ph type="sldImg"/>
+          </p:nvPr>
+        </p:nvSpPr>
+        <p:spPr>
+          <a:xfrm>
+            <a:off x="381000" y="685800"/>
+            <a:ext cx="6096000" cy="3429000"/>
+          </a:xfrm>
+        </p:spPr>
+      </p:sp>
+      <p:sp>
+        <p:nvSpPr>
+          <p:cNvPr id="3" name="Notes Placeholder 2"/>
+          <p:cNvSpPr>
+            <a:spLocks noGrp="1"/>
+          </p:cNvSpPr>
+          <p:nvPr>
+            <p:ph type="body" idx="1"/>
+          </p:nvPr>
+        </p:nvSpPr>
+        <p:spPr/>
+        <p:txBody>
+          <a:bodyPr/>
+          <a:lstStyle/>
+          <a:p>
             <a:r>
               <a:rPr lang="en-US" dirty="0"/>
-              <a:t>In this example there</a:t>
+              <a:t>This is</a:t>
             </a:r>
             <a:r>
               <a:rPr lang="en-US" baseline="0" dirty="0"/>
-              <a:t> are two types of secrets, nuclear and biological, and each has a couple of security levels. Of course, being cleared for Secret nuclear documents doesn’t automatically give you any clearance for biological documents. So we need a “lattice” to represent clearance and classification levels.</a:t>
+              <a:t> one way to simplify access control, in the military context.</a:t>
             </a:r>
           </a:p>
           <a:p>
@@ -10301,8 +10912,9 @@
           <a:p>
             <a:r>
               <a:rPr lang="en-US" baseline="0" dirty="0"/>
-              <a:t>More info: Denning’s Lattice-based Security</a:t>
-            </a:r>
+              <a:t>You can’t read above your clearance level, or write below it.  You can transfer information from a higher to a lower-level document in special cases, for example, declassification.</a:t>
+            </a:r>
+            <a:endParaRPr lang="en-US" dirty="0"/>
           </a:p>
         </p:txBody>
       </p:sp>
@@ -10325,6 +10937,112 @@
               <a:rPr lang="en-US" smtClean="0"/>
               <a:pPr/>
               <a:t>57</a:t>
+            </a:fld>
+            <a:endParaRPr lang="en-US"/>
+          </a:p>
+        </p:txBody>
+      </p:sp>
+    </p:spTree>
+    <p:extLst>
+      <p:ext uri="{BB962C8B-B14F-4D97-AF65-F5344CB8AC3E}">
+        <p14:creationId xmlns:p14="http://schemas.microsoft.com/office/powerpoint/2010/main" val="590441656"/>
+      </p:ext>
+    </p:extLst>
+  </p:cSld>
+  <p:clrMapOvr>
+    <a:masterClrMapping/>
+  </p:clrMapOvr>
+</p:notes>
+</file>
+
+<file path=ppt/notesSlides/notesSlide46.xml><?xml version="1.0" encoding="utf-8"?>
+<p:notes xmlns:a="http://schemas.openxmlformats.org/drawingml/2006/main" xmlns:r="http://schemas.openxmlformats.org/officeDocument/2006/relationships" xmlns:p="http://schemas.openxmlformats.org/presentationml/2006/main">
+  <p:cSld>
+    <p:spTree>
+      <p:nvGrpSpPr>
+        <p:cNvPr id="1" name=""/>
+        <p:cNvGrpSpPr/>
+        <p:nvPr/>
+      </p:nvGrpSpPr>
+      <p:grpSpPr>
+        <a:xfrm>
+          <a:off x="0" y="0"/>
+          <a:ext cx="0" cy="0"/>
+          <a:chOff x="0" y="0"/>
+          <a:chExt cx="0" cy="0"/>
+        </a:xfrm>
+      </p:grpSpPr>
+      <p:sp>
+        <p:nvSpPr>
+          <p:cNvPr id="2" name="Slide Image Placeholder 1"/>
+          <p:cNvSpPr>
+            <a:spLocks noGrp="1" noRot="1" noChangeAspect="1"/>
+          </p:cNvSpPr>
+          <p:nvPr>
+            <p:ph type="sldImg"/>
+          </p:nvPr>
+        </p:nvSpPr>
+        <p:spPr>
+          <a:xfrm>
+            <a:off x="381000" y="685800"/>
+            <a:ext cx="6096000" cy="3429000"/>
+          </a:xfrm>
+        </p:spPr>
+      </p:sp>
+      <p:sp>
+        <p:nvSpPr>
+          <p:cNvPr id="3" name="Notes Placeholder 2"/>
+          <p:cNvSpPr>
+            <a:spLocks noGrp="1"/>
+          </p:cNvSpPr>
+          <p:nvPr>
+            <p:ph type="body" idx="1"/>
+          </p:nvPr>
+        </p:nvSpPr>
+        <p:spPr/>
+        <p:txBody>
+          <a:bodyPr/>
+          <a:lstStyle/>
+          <a:p>
+            <a:r>
+              <a:rPr lang="en-US" dirty="0"/>
+              <a:t>In this example there</a:t>
+            </a:r>
+            <a:r>
+              <a:rPr lang="en-US" baseline="0" dirty="0"/>
+              <a:t> are two types of secrets, nuclear and biological, and each has a couple of security levels. Of course, being cleared for Secret nuclear documents doesn’t automatically give you any clearance for biological documents. So we need a “lattice” to represent clearance and classification levels.</a:t>
+            </a:r>
+          </a:p>
+          <a:p>
+            <a:endParaRPr lang="en-US" baseline="0" dirty="0"/>
+          </a:p>
+          <a:p>
+            <a:r>
+              <a:rPr lang="en-US" baseline="0" dirty="0"/>
+              <a:t>More info: Denning’s Lattice-based Security</a:t>
+            </a:r>
+          </a:p>
+        </p:txBody>
+      </p:sp>
+      <p:sp>
+        <p:nvSpPr>
+          <p:cNvPr id="4" name="Slide Number Placeholder 3"/>
+          <p:cNvSpPr>
+            <a:spLocks noGrp="1"/>
+          </p:cNvSpPr>
+          <p:nvPr>
+            <p:ph type="sldNum" sz="quarter" idx="10"/>
+          </p:nvPr>
+        </p:nvSpPr>
+        <p:spPr/>
+        <p:txBody>
+          <a:bodyPr/>
+          <a:lstStyle/>
+          <a:p>
+            <a:fld id="{94566334-40D3-444A-87CD-672C33ED3DCC}" type="slidenum">
+              <a:rPr lang="en-US" smtClean="0"/>
+              <a:pPr/>
+              <a:t>58</a:t>
             </a:fld>
             <a:endParaRPr lang="en-US"/>
           </a:p>
@@ -15392,7 +16110,7 @@
           <a:noFill/>
           <a:extLst>
             <a:ext uri="{909E8E84-426E-40dd-AFC4-6F175D3DCCD1}">
-              <a14:hiddenFill xmlns:a14="http://schemas.microsoft.com/office/drawing/2010/main" xmlns="">
+              <a14:hiddenFill xmlns="" xmlns:a14="http://schemas.microsoft.com/office/drawing/2010/main">
                 <a:solidFill>
                   <a:srgbClr val="FFFFFF"/>
                 </a:solidFill>
@@ -15698,7 +16416,7 @@
           <a:noFill/>
           <a:extLst>
             <a:ext uri="{909E8E84-426E-40dd-AFC4-6F175D3DCCD1}">
-              <a14:hiddenFill xmlns:a14="http://schemas.microsoft.com/office/drawing/2010/main" xmlns="">
+              <a14:hiddenFill xmlns="" xmlns:a14="http://schemas.microsoft.com/office/drawing/2010/main">
                 <a:solidFill>
                   <a:srgbClr val="FFFFFF"/>
                 </a:solidFill>
@@ -16396,7 +17114,7 @@
           <a:lstStyle/>
           <a:p>
             <a:r>
-              <a:t>What is OAuth 2?</a:t>
+              <a:t>Pre-OAuth Insecure Patterns</a:t>
             </a:r>
           </a:p>
         </p:txBody>
@@ -16420,22 +17138,17 @@
           </a:p>
           <a:p>
             <a:r>
-              <a:t>Delegation protocol over HTTP for limited access to resources</a:t>
-            </a:r>
-          </a:p>
-          <a:p>
-            <a:r>
-              <a:t>Allows access without sharing credentials</a:t>
-            </a:r>
-          </a:p>
-          <a:p>
-            <a:r>
-              <a:t>Framework, not a full authentication protocol</a:t>
-            </a:r>
-          </a:p>
-          <a:p>
-            <a:r>
-              <a:t>Implementation-specific cryptography</a:t>
+              <a:t>Credential sharing and universal passwords</a:t>
+            </a:r>
+          </a:p>
+          <a:p>
+            <a:r>
+              <a:t>Users entering credentials in third-party apps</a:t>
+            </a:r>
+          </a:p>
+          <a:p>
+            <a:r>
+              <a:t>Poor scalability and auditability</a:t>
             </a:r>
           </a:p>
         </p:txBody>
@@ -16481,7 +17194,7 @@
           <a:lstStyle/>
           <a:p>
             <a:r>
-              <a:t>Core Roles</a:t>
+              <a:t>What is OAuth 2?</a:t>
             </a:r>
           </a:p>
         </p:txBody>
@@ -16505,22 +17218,22 @@
           </a:p>
           <a:p>
             <a:r>
-              <a:t>Resource Owner – owns protected data</a:t>
-            </a:r>
-          </a:p>
-          <a:p>
-            <a:r>
-              <a:t>Client – app seeking access</a:t>
-            </a:r>
-          </a:p>
-          <a:p>
-            <a:r>
-              <a:t>Authorization Server – issues tokens</a:t>
-            </a:r>
-          </a:p>
-          <a:p>
-            <a:r>
-              <a:t>Resource Server – validates tokens and serves data</a:t>
+              <a:t>Delegation protocol over HTTP for limited access to resources</a:t>
+            </a:r>
+          </a:p>
+          <a:p>
+            <a:r>
+              <a:t>Allows access without sharing credentials</a:t>
+            </a:r>
+          </a:p>
+          <a:p>
+            <a:r>
+              <a:t>Framework, not a full authentication protocol</a:t>
+            </a:r>
+          </a:p>
+          <a:p>
+            <a:r>
+              <a:t>Implementation-specific cryptography</a:t>
             </a:r>
           </a:p>
         </p:txBody>
@@ -16566,7 +17279,7 @@
           <a:lstStyle/>
           <a:p>
             <a:r>
-              <a:t>Access Tokens &amp; Flow</a:t>
+              <a:t>Core Roles</a:t>
             </a:r>
           </a:p>
         </p:txBody>
@@ -16590,17 +17303,22 @@
           </a:p>
           <a:p>
             <a:r>
-              <a:t>Access token = delegated rights (scope)</a:t>
-            </a:r>
-          </a:p>
-          <a:p>
-            <a:r>
-              <a:t>Opaque to client</a:t>
-            </a:r>
-          </a:p>
-          <a:p>
-            <a:r>
-              <a:t>Flow: authorization → grant → token → resource access</a:t>
+              <a:t>Resource Owner – owns protected data</a:t>
+            </a:r>
+          </a:p>
+          <a:p>
+            <a:r>
+              <a:t>Client – app seeking access</a:t>
+            </a:r>
+          </a:p>
+          <a:p>
+            <a:r>
+              <a:t>Authorization Server – issues tokens</a:t>
+            </a:r>
+          </a:p>
+          <a:p>
+            <a:r>
+              <a:t>Resource Server – validates tokens and serves data</a:t>
             </a:r>
           </a:p>
         </p:txBody>
@@ -16646,7 +17364,7 @@
           <a:lstStyle/>
           <a:p>
             <a:r>
-              <a:t>Pre-OAuth Insecure Patterns</a:t>
+              <a:t>Access Tokens &amp; Flow</a:t>
             </a:r>
           </a:p>
         </p:txBody>
@@ -16670,17 +17388,17 @@
           </a:p>
           <a:p>
             <a:r>
-              <a:t>Credential sharing and universal passwords</a:t>
-            </a:r>
-          </a:p>
-          <a:p>
-            <a:r>
-              <a:t>Users entering credentials in third-party apps</a:t>
-            </a:r>
-          </a:p>
-          <a:p>
-            <a:r>
-              <a:t>Poor scalability and auditability</a:t>
+              <a:t>Access token = delegated rights (scope)</a:t>
+            </a:r>
+          </a:p>
+          <a:p>
+            <a:r>
+              <a:t>Opaque to client</a:t>
+            </a:r>
+          </a:p>
+          <a:p>
+            <a:r>
+              <a:t>Flow: authorization → grant → token → resource access</a:t>
             </a:r>
           </a:p>
         </p:txBody>
@@ -17077,7 +17795,7 @@
           <a:noFill/>
           <a:extLst>
             <a:ext uri="{909E8E84-426E-40dd-AFC4-6F175D3DCCD1}">
-              <a14:hiddenFill xmlns:a14="http://schemas.microsoft.com/office/drawing/2010/main" xmlns="">
+              <a14:hiddenFill xmlns="" xmlns:a14="http://schemas.microsoft.com/office/drawing/2010/main">
                 <a:solidFill>
                   <a:srgbClr val="FFFFFF"/>
                 </a:solidFill>
@@ -17623,7 +18341,7 @@
           <a:noFill/>
           <a:extLst>
             <a:ext uri="{909E8E84-426E-40dd-AFC4-6F175D3DCCD1}">
-              <a14:hiddenFill xmlns:a14="http://schemas.microsoft.com/office/drawing/2010/main" xmlns="">
+              <a14:hiddenFill xmlns="" xmlns:a14="http://schemas.microsoft.com/office/drawing/2010/main">
                 <a:solidFill>
                   <a:srgbClr val="FFFFFF"/>
                 </a:solidFill>
@@ -17664,7 +18382,7 @@
           <a:noFill/>
           <a:extLst>
             <a:ext uri="{909E8E84-426E-40dd-AFC4-6F175D3DCCD1}">
-              <a14:hiddenFill xmlns:a14="http://schemas.microsoft.com/office/drawing/2010/main" xmlns="">
+              <a14:hiddenFill xmlns="" xmlns:a14="http://schemas.microsoft.com/office/drawing/2010/main">
                 <a:solidFill>
                   <a:srgbClr val="FFFFFF"/>
                 </a:solidFill>
@@ -18302,7 +19020,7 @@
           <p:nvPr/>
         </p:nvPicPr>
         <p:blipFill>
-          <a:blip r:embed="rId2"/>
+          <a:blip r:embed="rId3"/>
           <a:stretch>
             <a:fillRect/>
           </a:stretch>
@@ -18397,6 +19115,116 @@
       </p:grpSpPr>
       <p:sp>
         <p:nvSpPr>
+          <p:cNvPr id="2" name="Title 1"/>
+          <p:cNvSpPr>
+            <a:spLocks noGrp="1"/>
+          </p:cNvSpPr>
+          <p:nvPr>
+            <p:ph type="title"/>
+          </p:nvPr>
+        </p:nvSpPr>
+        <p:spPr/>
+        <p:txBody>
+          <a:bodyPr/>
+          <a:lstStyle/>
+          <a:p>
+            <a:r>
+              <a:t>Simplified OAuth 2 Flow</a:t>
+            </a:r>
+          </a:p>
+        </p:txBody>
+      </p:sp>
+      <p:sp>
+        <p:nvSpPr>
+          <p:cNvPr id="3" name="Content Placeholder 2"/>
+          <p:cNvSpPr>
+            <a:spLocks noGrp="1"/>
+          </p:cNvSpPr>
+          <p:nvPr>
+            <p:ph idx="1"/>
+          </p:nvPr>
+        </p:nvSpPr>
+        <p:spPr/>
+        <p:txBody>
+          <a:bodyPr/>
+          <a:lstStyle/>
+          <a:p>
+            <a:endParaRPr dirty="0"/>
+          </a:p>
+          <a:p>
+            <a:pPr marL="0" indent="0">
+              <a:buNone/>
+            </a:pPr>
+            <a:r>
+              <a:rPr dirty="0"/>
+              <a:t>1. User authorizes the app → redirected to Authorization Server</a:t>
+            </a:r>
+          </a:p>
+          <a:p>
+            <a:pPr marL="0" indent="0">
+              <a:buNone/>
+            </a:pPr>
+            <a:r>
+              <a:rPr dirty="0"/>
+              <a:t>2. Authorization Server issues an authorization code</a:t>
+            </a:r>
+          </a:p>
+          <a:p>
+            <a:pPr marL="0" indent="0">
+              <a:buNone/>
+            </a:pPr>
+            <a:r>
+              <a:rPr dirty="0"/>
+              <a:t>3. App exchanges code for an access token</a:t>
+            </a:r>
+          </a:p>
+          <a:p>
+            <a:pPr marL="0" indent="0">
+              <a:buNone/>
+            </a:pPr>
+            <a:r>
+              <a:rPr dirty="0"/>
+              <a:t>4. App uses token to access the Resource Server</a:t>
+            </a:r>
+          </a:p>
+          <a:p>
+            <a:pPr marL="0" indent="0">
+              <a:buNone/>
+            </a:pPr>
+            <a:r>
+              <a:rPr dirty="0"/>
+              <a:t>5. Token expires → refresh token (if issued) allows renewal</a:t>
+            </a:r>
+          </a:p>
+        </p:txBody>
+      </p:sp>
+    </p:spTree>
+  </p:cSld>
+  <p:clrMapOvr>
+    <a:masterClrMapping/>
+  </p:clrMapOvr>
+</p:sld>
+</file>
+
+<file path=ppt/slides/slide34.xml><?xml version="1.0" encoding="utf-8"?>
+<p:sld xmlns:a="http://schemas.openxmlformats.org/drawingml/2006/main" xmlns:r="http://schemas.openxmlformats.org/officeDocument/2006/relationships" xmlns:p="http://schemas.openxmlformats.org/presentationml/2006/main">
+  <p:cSld>
+    <p:spTree>
+      <p:nvGrpSpPr>
+        <p:cNvPr id="1" name=""/>
+        <p:cNvGrpSpPr/>
+        <p:nvPr/>
+      </p:nvGrpSpPr>
+      <p:grpSpPr>
+        <a:xfrm>
+          <a:off x="0" y="0"/>
+          <a:ext cx="0" cy="0"/>
+          <a:chOff x="0" y="0"/>
+          <a:chExt cx="0" cy="0"/>
+        </a:xfrm>
+      </p:grpSpPr>
+      <p:sp>
+        <p:nvSpPr>
           <p:cNvPr id="7" name="TextBox 6">
             <a:extLst>
               <a:ext uri="{FF2B5EF4-FFF2-40B4-BE49-F238E27FC236}">
@@ -18746,7 +19574,7 @@
 </p:sld>
 </file>
 
-<file path=ppt/slides/slide34.xml><?xml version="1.0" encoding="utf-8"?>
+<file path=ppt/slides/slide35.xml><?xml version="1.0" encoding="utf-8"?>
 <p:sld xmlns:a="http://schemas.openxmlformats.org/drawingml/2006/main" xmlns:r="http://schemas.openxmlformats.org/officeDocument/2006/relationships" xmlns:p="http://schemas.openxmlformats.org/presentationml/2006/main">
   <p:cSld>
     <p:spTree>
@@ -18852,72 +19680,6 @@
 </p:sld>
 </file>
 
-<file path=ppt/slides/slide35.xml><?xml version="1.0" encoding="utf-8"?>
-<p:sld xmlns:a="http://schemas.openxmlformats.org/drawingml/2006/main" xmlns:r="http://schemas.openxmlformats.org/officeDocument/2006/relationships" xmlns:p="http://schemas.openxmlformats.org/presentationml/2006/main">
-  <p:cSld>
-    <p:spTree>
-      <p:nvGrpSpPr>
-        <p:cNvPr id="1" name=""/>
-        <p:cNvGrpSpPr/>
-        <p:nvPr/>
-      </p:nvGrpSpPr>
-      <p:grpSpPr>
-        <a:xfrm>
-          <a:off x="0" y="0"/>
-          <a:ext cx="0" cy="0"/>
-          <a:chOff x="0" y="0"/>
-          <a:chExt cx="0" cy="0"/>
-        </a:xfrm>
-      </p:grpSpPr>
-      <p:sp>
-        <p:nvSpPr>
-          <p:cNvPr id="2" name="Title 1"/>
-          <p:cNvSpPr>
-            <a:spLocks noGrp="1"/>
-          </p:cNvSpPr>
-          <p:nvPr>
-            <p:ph type="title"/>
-          </p:nvPr>
-        </p:nvSpPr>
-        <p:spPr>
-          <a:xfrm>
-            <a:off x="1485900" y="1751145"/>
-            <a:ext cx="6172200" cy="857250"/>
-          </a:xfrm>
-        </p:spPr>
-        <p:txBody>
-          <a:bodyPr>
-            <a:normAutofit fontScale="90000"/>
-          </a:bodyPr>
-          <a:lstStyle/>
-          <a:p>
-            <a:r>
-              <a:rPr lang="en-US" dirty="0"/>
-              <a:t>Network Access Control:</a:t>
-            </a:r>
-            <a:br>
-              <a:rPr lang="en-US" dirty="0"/>
-            </a:br>
-            <a:r>
-              <a:rPr lang="en-US" dirty="0"/>
-              <a:t>Virtual Private Networks</a:t>
-            </a:r>
-          </a:p>
-        </p:txBody>
-      </p:sp>
-    </p:spTree>
-    <p:extLst>
-      <p:ext uri="{BB962C8B-B14F-4D97-AF65-F5344CB8AC3E}">
-        <p14:creationId xmlns:p14="http://schemas.microsoft.com/office/powerpoint/2010/main" val="4142301985"/>
-      </p:ext>
-    </p:extLst>
-  </p:cSld>
-  <p:clrMapOvr>
-    <a:masterClrMapping/>
-  </p:clrMapOvr>
-</p:sld>
-</file>
-
 <file path=ppt/slides/slide36.xml><?xml version="1.0" encoding="utf-8"?>
 <p:sld xmlns:a="http://schemas.openxmlformats.org/drawingml/2006/main" xmlns:r="http://schemas.openxmlformats.org/officeDocument/2006/relationships" xmlns:p="http://schemas.openxmlformats.org/presentationml/2006/main">
   <p:cSld>
@@ -18937,75 +19699,36 @@
       </p:grpSpPr>
       <p:sp>
         <p:nvSpPr>
-          <p:cNvPr id="1716226" name="Rectangle 2"/>
-          <p:cNvSpPr>
-            <a:spLocks noGrp="1" noChangeArrowheads="1"/>
+          <p:cNvPr id="2" name="Title 1"/>
+          <p:cNvSpPr>
+            <a:spLocks noGrp="1"/>
           </p:cNvSpPr>
           <p:nvPr>
             <p:ph type="title"/>
           </p:nvPr>
         </p:nvSpPr>
-        <p:spPr/>
-        <p:txBody>
-          <a:bodyPr/>
+        <p:spPr>
+          <a:xfrm>
+            <a:off x="1485900" y="1751145"/>
+            <a:ext cx="6172200" cy="857250"/>
+          </a:xfrm>
+        </p:spPr>
+        <p:txBody>
+          <a:bodyPr>
+            <a:normAutofit fontScale="90000"/>
+          </a:bodyPr>
           <a:lstStyle/>
           <a:p>
             <a:r>
-              <a:rPr lang="en-US"/>
-              <a:t>What is a VPN?</a:t>
-            </a:r>
-          </a:p>
-        </p:txBody>
-      </p:sp>
-      <p:sp>
-        <p:nvSpPr>
-          <p:cNvPr id="1716227" name="Rectangle 3"/>
-          <p:cNvSpPr>
-            <a:spLocks noGrp="1" noChangeArrowheads="1"/>
-          </p:cNvSpPr>
-          <p:nvPr>
-            <p:ph idx="1"/>
-          </p:nvPr>
-        </p:nvSpPr>
-        <p:spPr/>
-        <p:txBody>
-          <a:bodyPr/>
-          <a:lstStyle/>
-          <a:p>
-            <a:r>
               <a:rPr lang="en-US" dirty="0"/>
-              <a:t>Making a shared network look like a private network.</a:t>
+              <a:t>Network Access Control:</a:t>
             </a:r>
             <a:br>
               <a:rPr lang="en-US" dirty="0"/>
             </a:br>
-            <a:endParaRPr lang="en-US" dirty="0"/>
-          </a:p>
-          <a:p>
             <a:r>
               <a:rPr lang="en-US" dirty="0"/>
-              <a:t>Why do this?</a:t>
-            </a:r>
-          </a:p>
-          <a:p>
-            <a:pPr lvl="1"/>
-            <a:r>
-              <a:rPr lang="en-US" dirty="0"/>
-              <a:t>Private networks have all kinds of advantages </a:t>
-            </a:r>
-          </a:p>
-          <a:p>
-            <a:pPr lvl="1"/>
-            <a:r>
-              <a:rPr lang="en-US" dirty="0"/>
-              <a:t>But building a private network is expensive</a:t>
-            </a:r>
-          </a:p>
-          <a:p>
-            <a:pPr lvl="2"/>
-            <a:r>
-              <a:rPr lang="en-US" dirty="0"/>
-              <a:t> (cheaper to have shared resources rather than dedicated)</a:t>
+              <a:t>Virtual Private Networks</a:t>
             </a:r>
           </a:p>
         </p:txBody>
@@ -19013,7 +19736,7 @@
     </p:spTree>
     <p:extLst>
       <p:ext uri="{BB962C8B-B14F-4D97-AF65-F5344CB8AC3E}">
-        <p14:creationId xmlns:p14="http://schemas.microsoft.com/office/powerpoint/2010/main" val="1037268395"/>
+        <p14:creationId xmlns:p14="http://schemas.microsoft.com/office/powerpoint/2010/main" val="4142301985"/>
       </p:ext>
     </p:extLst>
   </p:cSld>
@@ -19042,6 +19765,111 @@
       </p:grpSpPr>
       <p:sp>
         <p:nvSpPr>
+          <p:cNvPr id="1716226" name="Rectangle 2"/>
+          <p:cNvSpPr>
+            <a:spLocks noGrp="1" noChangeArrowheads="1"/>
+          </p:cNvSpPr>
+          <p:nvPr>
+            <p:ph type="title"/>
+          </p:nvPr>
+        </p:nvSpPr>
+        <p:spPr/>
+        <p:txBody>
+          <a:bodyPr/>
+          <a:lstStyle/>
+          <a:p>
+            <a:r>
+              <a:rPr lang="en-US"/>
+              <a:t>What is a VPN?</a:t>
+            </a:r>
+          </a:p>
+        </p:txBody>
+      </p:sp>
+      <p:sp>
+        <p:nvSpPr>
+          <p:cNvPr id="1716227" name="Rectangle 3"/>
+          <p:cNvSpPr>
+            <a:spLocks noGrp="1" noChangeArrowheads="1"/>
+          </p:cNvSpPr>
+          <p:nvPr>
+            <p:ph idx="1"/>
+          </p:nvPr>
+        </p:nvSpPr>
+        <p:spPr/>
+        <p:txBody>
+          <a:bodyPr/>
+          <a:lstStyle/>
+          <a:p>
+            <a:r>
+              <a:rPr lang="en-US" dirty="0"/>
+              <a:t>Making a shared network look like a private network.</a:t>
+            </a:r>
+            <a:br>
+              <a:rPr lang="en-US" dirty="0"/>
+            </a:br>
+            <a:endParaRPr lang="en-US" dirty="0"/>
+          </a:p>
+          <a:p>
+            <a:r>
+              <a:rPr lang="en-US" dirty="0"/>
+              <a:t>Why do this?</a:t>
+            </a:r>
+          </a:p>
+          <a:p>
+            <a:pPr lvl="1"/>
+            <a:r>
+              <a:rPr lang="en-US" dirty="0"/>
+              <a:t>Private networks have all kinds of advantages </a:t>
+            </a:r>
+          </a:p>
+          <a:p>
+            <a:pPr lvl="1"/>
+            <a:r>
+              <a:rPr lang="en-US" dirty="0"/>
+              <a:t>But building a private network is expensive</a:t>
+            </a:r>
+          </a:p>
+          <a:p>
+            <a:pPr lvl="2"/>
+            <a:r>
+              <a:rPr lang="en-US" dirty="0"/>
+              <a:t> (cheaper to have shared resources rather than dedicated)</a:t>
+            </a:r>
+          </a:p>
+        </p:txBody>
+      </p:sp>
+    </p:spTree>
+    <p:extLst>
+      <p:ext uri="{BB962C8B-B14F-4D97-AF65-F5344CB8AC3E}">
+        <p14:creationId xmlns:p14="http://schemas.microsoft.com/office/powerpoint/2010/main" val="1037268395"/>
+      </p:ext>
+    </p:extLst>
+  </p:cSld>
+  <p:clrMapOvr>
+    <a:masterClrMapping/>
+  </p:clrMapOvr>
+</p:sld>
+</file>
+
+<file path=ppt/slides/slide38.xml><?xml version="1.0" encoding="utf-8"?>
+<p:sld xmlns:a="http://schemas.openxmlformats.org/drawingml/2006/main" xmlns:r="http://schemas.openxmlformats.org/officeDocument/2006/relationships" xmlns:p="http://schemas.openxmlformats.org/presentationml/2006/main">
+  <p:cSld>
+    <p:spTree>
+      <p:nvGrpSpPr>
+        <p:cNvPr id="1" name=""/>
+        <p:cNvGrpSpPr/>
+        <p:nvPr/>
+      </p:nvGrpSpPr>
+      <p:grpSpPr>
+        <a:xfrm>
+          <a:off x="0" y="0"/>
+          <a:ext cx="0" cy="0"/>
+          <a:chOff x="0" y="0"/>
+          <a:chExt cx="0" cy="0"/>
+        </a:xfrm>
+      </p:grpSpPr>
+      <p:sp>
+        <p:nvSpPr>
           <p:cNvPr id="2" name="Title 1"/>
           <p:cNvSpPr>
             <a:spLocks noGrp="1"/>
@@ -19130,7 +19958,7 @@
 </p:sld>
 </file>
 
-<file path=ppt/slides/slide38.xml><?xml version="1.0" encoding="utf-8"?>
+<file path=ppt/slides/slide39.xml><?xml version="1.0" encoding="utf-8"?>
 <p:sld xmlns:a="http://schemas.openxmlformats.org/drawingml/2006/main" xmlns:r="http://schemas.openxmlformats.org/officeDocument/2006/relationships" xmlns:p="http://schemas.openxmlformats.org/presentationml/2006/main">
   <p:cSld>
     <p:spTree>
@@ -19181,69 +20009,6 @@
     <p:extLst>
       <p:ext uri="{BB962C8B-B14F-4D97-AF65-F5344CB8AC3E}">
         <p14:creationId xmlns:p14="http://schemas.microsoft.com/office/powerpoint/2010/main" val="2606018539"/>
-      </p:ext>
-    </p:extLst>
-  </p:cSld>
-  <p:clrMapOvr>
-    <a:masterClrMapping/>
-  </p:clrMapOvr>
-</p:sld>
-</file>
-
-<file path=ppt/slides/slide39.xml><?xml version="1.0" encoding="utf-8"?>
-<p:sld xmlns:a="http://schemas.openxmlformats.org/drawingml/2006/main" xmlns:r="http://schemas.openxmlformats.org/officeDocument/2006/relationships" xmlns:p="http://schemas.openxmlformats.org/presentationml/2006/main">
-  <p:cSld>
-    <p:spTree>
-      <p:nvGrpSpPr>
-        <p:cNvPr id="1" name=""/>
-        <p:cNvGrpSpPr/>
-        <p:nvPr/>
-      </p:nvGrpSpPr>
-      <p:grpSpPr>
-        <a:xfrm>
-          <a:off x="0" y="0"/>
-          <a:ext cx="0" cy="0"/>
-          <a:chOff x="0" y="0"/>
-          <a:chExt cx="0" cy="0"/>
-        </a:xfrm>
-      </p:grpSpPr>
-      <p:sp>
-        <p:nvSpPr>
-          <p:cNvPr id="2" name="Title 1">
-            <a:extLst>
-              <a:ext uri="{FF2B5EF4-FFF2-40B4-BE49-F238E27FC236}">
-                <a16:creationId xmlns:a16="http://schemas.microsoft.com/office/drawing/2014/main" id="{6A2CEE6A-C620-F543-BC0D-0C08C15D0993}"/>
-              </a:ext>
-            </a:extLst>
-          </p:cNvPr>
-          <p:cNvSpPr>
-            <a:spLocks noGrp="1"/>
-          </p:cNvSpPr>
-          <p:nvPr>
-            <p:ph type="title"/>
-          </p:nvPr>
-        </p:nvSpPr>
-        <p:spPr>
-          <a:xfrm>
-            <a:off x="457200" y="1714500"/>
-            <a:ext cx="8229600" cy="857250"/>
-          </a:xfrm>
-        </p:spPr>
-        <p:txBody>
-          <a:bodyPr/>
-          <a:lstStyle/>
-          <a:p>
-            <a:r>
-              <a:rPr lang="en-US" dirty="0"/>
-              <a:t>Breakout Session</a:t>
-            </a:r>
-          </a:p>
-        </p:txBody>
-      </p:sp>
-    </p:spTree>
-    <p:extLst>
-      <p:ext uri="{BB962C8B-B14F-4D97-AF65-F5344CB8AC3E}">
-        <p14:creationId xmlns:p14="http://schemas.microsoft.com/office/powerpoint/2010/main" val="4153658028"/>
       </p:ext>
     </p:extLst>
   </p:cSld>
@@ -19511,6 +20276,69 @@
 </file>
 
 <file path=ppt/slides/slide40.xml><?xml version="1.0" encoding="utf-8"?>
+<p:sld xmlns:a="http://schemas.openxmlformats.org/drawingml/2006/main" xmlns:r="http://schemas.openxmlformats.org/officeDocument/2006/relationships" xmlns:p="http://schemas.openxmlformats.org/presentationml/2006/main">
+  <p:cSld>
+    <p:spTree>
+      <p:nvGrpSpPr>
+        <p:cNvPr id="1" name=""/>
+        <p:cNvGrpSpPr/>
+        <p:nvPr/>
+      </p:nvGrpSpPr>
+      <p:grpSpPr>
+        <a:xfrm>
+          <a:off x="0" y="0"/>
+          <a:ext cx="0" cy="0"/>
+          <a:chOff x="0" y="0"/>
+          <a:chExt cx="0" cy="0"/>
+        </a:xfrm>
+      </p:grpSpPr>
+      <p:sp>
+        <p:nvSpPr>
+          <p:cNvPr id="2" name="Title 1">
+            <a:extLst>
+              <a:ext uri="{FF2B5EF4-FFF2-40B4-BE49-F238E27FC236}">
+                <a16:creationId xmlns:a16="http://schemas.microsoft.com/office/drawing/2014/main" id="{6A2CEE6A-C620-F543-BC0D-0C08C15D0993}"/>
+              </a:ext>
+            </a:extLst>
+          </p:cNvPr>
+          <p:cNvSpPr>
+            <a:spLocks noGrp="1"/>
+          </p:cNvSpPr>
+          <p:nvPr>
+            <p:ph type="title"/>
+          </p:nvPr>
+        </p:nvSpPr>
+        <p:spPr>
+          <a:xfrm>
+            <a:off x="457200" y="1714500"/>
+            <a:ext cx="8229600" cy="857250"/>
+          </a:xfrm>
+        </p:spPr>
+        <p:txBody>
+          <a:bodyPr/>
+          <a:lstStyle/>
+          <a:p>
+            <a:r>
+              <a:rPr lang="en-US" dirty="0"/>
+              <a:t>Breakout Session</a:t>
+            </a:r>
+          </a:p>
+        </p:txBody>
+      </p:sp>
+    </p:spTree>
+    <p:extLst>
+      <p:ext uri="{BB962C8B-B14F-4D97-AF65-F5344CB8AC3E}">
+        <p14:creationId xmlns:p14="http://schemas.microsoft.com/office/powerpoint/2010/main" val="4153658028"/>
+      </p:ext>
+    </p:extLst>
+  </p:cSld>
+  <p:clrMapOvr>
+    <a:masterClrMapping/>
+  </p:clrMapOvr>
+</p:sld>
+</file>
+
+<file path=ppt/slides/slide41.xml><?xml version="1.0" encoding="utf-8"?>
 <p:sld xmlns:a="http://schemas.openxmlformats.org/drawingml/2006/main" xmlns:r="http://schemas.openxmlformats.org/officeDocument/2006/relationships" xmlns:p="http://schemas.openxmlformats.org/presentationml/2006/main" show="0">
   <p:cSld>
     <p:spTree>
@@ -19766,7 +20594,7 @@
           <a:noFill/>
           <a:extLst>
             <a:ext uri="{909E8E84-426E-40dd-AFC4-6F175D3DCCD1}">
-              <a14:hiddenFill xmlns:a14="http://schemas.microsoft.com/office/drawing/2010/main" xmlns="">
+              <a14:hiddenFill xmlns="" xmlns:a14="http://schemas.microsoft.com/office/drawing/2010/main">
                 <a:solidFill>
                   <a:srgbClr val="FFFFFF"/>
                 </a:solidFill>
@@ -20233,7 +21061,7 @@
 </p:sld>
 </file>
 
-<file path=ppt/slides/slide41.xml><?xml version="1.0" encoding="utf-8"?>
+<file path=ppt/slides/slide42.xml><?xml version="1.0" encoding="utf-8"?>
 <p:sld xmlns:a="http://schemas.openxmlformats.org/drawingml/2006/main" xmlns:r="http://schemas.openxmlformats.org/officeDocument/2006/relationships" xmlns:p="http://schemas.openxmlformats.org/presentationml/2006/main" show="0">
   <p:cSld>
     <p:spTree>
@@ -21117,103 +21945,6 @@
 </p:sld>
 </file>
 
-<file path=ppt/slides/slide42.xml><?xml version="1.0" encoding="utf-8"?>
-<p:sld xmlns:a="http://schemas.openxmlformats.org/drawingml/2006/main" xmlns:r="http://schemas.openxmlformats.org/officeDocument/2006/relationships" xmlns:p="http://schemas.openxmlformats.org/presentationml/2006/main" show="0">
-  <p:cSld>
-    <p:spTree>
-      <p:nvGrpSpPr>
-        <p:cNvPr id="1" name=""/>
-        <p:cNvGrpSpPr/>
-        <p:nvPr/>
-      </p:nvGrpSpPr>
-      <p:grpSpPr>
-        <a:xfrm>
-          <a:off x="0" y="0"/>
-          <a:ext cx="0" cy="0"/>
-          <a:chOff x="0" y="0"/>
-          <a:chExt cx="0" cy="0"/>
-        </a:xfrm>
-      </p:grpSpPr>
-      <p:sp>
-        <p:nvSpPr>
-          <p:cNvPr id="2" name="Title 1"/>
-          <p:cNvSpPr>
-            <a:spLocks noGrp="1"/>
-          </p:cNvSpPr>
-          <p:nvPr>
-            <p:ph type="title"/>
-          </p:nvPr>
-        </p:nvSpPr>
-        <p:spPr/>
-        <p:txBody>
-          <a:bodyPr/>
-          <a:lstStyle/>
-          <a:p>
-            <a:r>
-              <a:rPr lang="en-US" dirty="0"/>
-              <a:t>VPNs</a:t>
-            </a:r>
-          </a:p>
-        </p:txBody>
-      </p:sp>
-      <p:sp>
-        <p:nvSpPr>
-          <p:cNvPr id="3" name="Content Placeholder 2"/>
-          <p:cNvSpPr>
-            <a:spLocks noGrp="1"/>
-          </p:cNvSpPr>
-          <p:nvPr>
-            <p:ph idx="1"/>
-          </p:nvPr>
-        </p:nvSpPr>
-        <p:spPr/>
-        <p:txBody>
-          <a:bodyPr/>
-          <a:lstStyle/>
-          <a:p>
-            <a:r>
-              <a:rPr lang="en-US" dirty="0"/>
-              <a:t>Tunneling, security, </a:t>
-            </a:r>
-            <a:r>
-              <a:rPr lang="en-US" dirty="0" err="1"/>
-              <a:t>QoS</a:t>
-            </a:r>
-            <a:endParaRPr lang="en-US" dirty="0"/>
-          </a:p>
-          <a:p>
-            <a:endParaRPr lang="en-US" dirty="0"/>
-          </a:p>
-          <a:p>
-            <a:r>
-              <a:rPr lang="en-US" dirty="0"/>
-              <a:t>Can also tunnel through SSH instead of IP</a:t>
-            </a:r>
-          </a:p>
-          <a:p>
-            <a:endParaRPr lang="en-US" dirty="0"/>
-          </a:p>
-          <a:p>
-            <a:r>
-              <a:rPr lang="en-US" dirty="0"/>
-              <a:t>Encryption, tunneling, firewall all possible in different layers!</a:t>
-            </a:r>
-          </a:p>
-        </p:txBody>
-      </p:sp>
-    </p:spTree>
-    <p:extLst>
-      <p:ext uri="{BB962C8B-B14F-4D97-AF65-F5344CB8AC3E}">
-        <p14:creationId xmlns:p14="http://schemas.microsoft.com/office/powerpoint/2010/main" val="3890418197"/>
-      </p:ext>
-    </p:extLst>
-  </p:cSld>
-  <p:clrMapOvr>
-    <a:masterClrMapping/>
-  </p:clrMapOvr>
-</p:sld>
-</file>
-
 <file path=ppt/slides/slide43.xml><?xml version="1.0" encoding="utf-8"?>
 <p:sld xmlns:a="http://schemas.openxmlformats.org/drawingml/2006/main" xmlns:r="http://schemas.openxmlformats.org/officeDocument/2006/relationships" xmlns:p="http://schemas.openxmlformats.org/presentationml/2006/main" show="0">
   <p:cSld>
@@ -21233,6 +21964,103 @@
       </p:grpSpPr>
       <p:sp>
         <p:nvSpPr>
+          <p:cNvPr id="2" name="Title 1"/>
+          <p:cNvSpPr>
+            <a:spLocks noGrp="1"/>
+          </p:cNvSpPr>
+          <p:nvPr>
+            <p:ph type="title"/>
+          </p:nvPr>
+        </p:nvSpPr>
+        <p:spPr/>
+        <p:txBody>
+          <a:bodyPr/>
+          <a:lstStyle/>
+          <a:p>
+            <a:r>
+              <a:rPr lang="en-US" dirty="0"/>
+              <a:t>VPNs</a:t>
+            </a:r>
+          </a:p>
+        </p:txBody>
+      </p:sp>
+      <p:sp>
+        <p:nvSpPr>
+          <p:cNvPr id="3" name="Content Placeholder 2"/>
+          <p:cNvSpPr>
+            <a:spLocks noGrp="1"/>
+          </p:cNvSpPr>
+          <p:nvPr>
+            <p:ph idx="1"/>
+          </p:nvPr>
+        </p:nvSpPr>
+        <p:spPr/>
+        <p:txBody>
+          <a:bodyPr/>
+          <a:lstStyle/>
+          <a:p>
+            <a:r>
+              <a:rPr lang="en-US" dirty="0"/>
+              <a:t>Tunneling, security, </a:t>
+            </a:r>
+            <a:r>
+              <a:rPr lang="en-US" dirty="0" err="1"/>
+              <a:t>QoS</a:t>
+            </a:r>
+            <a:endParaRPr lang="en-US" dirty="0"/>
+          </a:p>
+          <a:p>
+            <a:endParaRPr lang="en-US" dirty="0"/>
+          </a:p>
+          <a:p>
+            <a:r>
+              <a:rPr lang="en-US" dirty="0"/>
+              <a:t>Can also tunnel through SSH instead of IP</a:t>
+            </a:r>
+          </a:p>
+          <a:p>
+            <a:endParaRPr lang="en-US" dirty="0"/>
+          </a:p>
+          <a:p>
+            <a:r>
+              <a:rPr lang="en-US" dirty="0"/>
+              <a:t>Encryption, tunneling, firewall all possible in different layers!</a:t>
+            </a:r>
+          </a:p>
+        </p:txBody>
+      </p:sp>
+    </p:spTree>
+    <p:extLst>
+      <p:ext uri="{BB962C8B-B14F-4D97-AF65-F5344CB8AC3E}">
+        <p14:creationId xmlns:p14="http://schemas.microsoft.com/office/powerpoint/2010/main" val="3890418197"/>
+      </p:ext>
+    </p:extLst>
+  </p:cSld>
+  <p:clrMapOvr>
+    <a:masterClrMapping/>
+  </p:clrMapOvr>
+</p:sld>
+</file>
+
+<file path=ppt/slides/slide44.xml><?xml version="1.0" encoding="utf-8"?>
+<p:sld xmlns:a="http://schemas.openxmlformats.org/drawingml/2006/main" xmlns:r="http://schemas.openxmlformats.org/officeDocument/2006/relationships" xmlns:p="http://schemas.openxmlformats.org/presentationml/2006/main" show="0">
+  <p:cSld>
+    <p:spTree>
+      <p:nvGrpSpPr>
+        <p:cNvPr id="1" name=""/>
+        <p:cNvGrpSpPr/>
+        <p:nvPr/>
+      </p:nvGrpSpPr>
+      <p:grpSpPr>
+        <a:xfrm>
+          <a:off x="0" y="0"/>
+          <a:ext cx="0" cy="0"/>
+          <a:chOff x="0" y="0"/>
+          <a:chExt cx="0" cy="0"/>
+        </a:xfrm>
+      </p:grpSpPr>
+      <p:sp>
+        <p:nvSpPr>
           <p:cNvPr id="1721346" name="Rectangle 2"/>
           <p:cNvSpPr>
             <a:spLocks noGrp="1" noChangeArrowheads="1"/>
@@ -21327,7 +22155,7 @@
 </p:sld>
 </file>
 
-<file path=ppt/slides/slide44.xml><?xml version="1.0" encoding="utf-8"?>
+<file path=ppt/slides/slide45.xml><?xml version="1.0" encoding="utf-8"?>
 <p:sld xmlns:a="http://schemas.openxmlformats.org/drawingml/2006/main" xmlns:r="http://schemas.openxmlformats.org/officeDocument/2006/relationships" xmlns:p="http://schemas.openxmlformats.org/presentationml/2006/main" show="0">
   <p:cSld>
     <p:spTree>
@@ -22609,7 +23437,7 @@
 </p:sld>
 </file>
 
-<file path=ppt/slides/slide45.xml><?xml version="1.0" encoding="utf-8"?>
+<file path=ppt/slides/slide46.xml><?xml version="1.0" encoding="utf-8"?>
 <p:sld xmlns:a="http://schemas.openxmlformats.org/drawingml/2006/main" xmlns:r="http://schemas.openxmlformats.org/officeDocument/2006/relationships" xmlns:p="http://schemas.openxmlformats.org/presentationml/2006/main" show="0">
   <p:cSld>
     <p:spTree>
@@ -22791,7 +23619,7 @@
 </p:sld>
 </file>
 
-<file path=ppt/slides/slide46.xml><?xml version="1.0" encoding="utf-8"?>
+<file path=ppt/slides/slide47.xml><?xml version="1.0" encoding="utf-8"?>
 <p:sld xmlns:a="http://schemas.openxmlformats.org/drawingml/2006/main" xmlns:r="http://schemas.openxmlformats.org/officeDocument/2006/relationships" xmlns:p="http://schemas.openxmlformats.org/presentationml/2006/main" show="0">
   <p:cSld>
     <p:spTree>
@@ -23123,7 +23951,7 @@
 </p:sld>
 </file>
 
-<file path=ppt/slides/slide47.xml><?xml version="1.0" encoding="utf-8"?>
+<file path=ppt/slides/slide48.xml><?xml version="1.0" encoding="utf-8"?>
 <p:sld xmlns:a="http://schemas.openxmlformats.org/drawingml/2006/main" xmlns:r="http://schemas.openxmlformats.org/officeDocument/2006/relationships" xmlns:p="http://schemas.openxmlformats.org/presentationml/2006/main" show="0">
   <p:cSld>
     <p:spTree>
@@ -23253,7 +24081,7 @@
 </p:sld>
 </file>
 
-<file path=ppt/slides/slide48.xml><?xml version="1.0" encoding="utf-8"?>
+<file path=ppt/slides/slide49.xml><?xml version="1.0" encoding="utf-8"?>
 <p:sld xmlns:a="http://schemas.openxmlformats.org/drawingml/2006/main" xmlns:r="http://schemas.openxmlformats.org/officeDocument/2006/relationships" xmlns:p="http://schemas.openxmlformats.org/presentationml/2006/main" show="0">
   <p:cSld>
     <p:spTree>
@@ -23673,7 +24501,132 @@
 </p:sld>
 </file>
 
-<file path=ppt/slides/slide49.xml><?xml version="1.0" encoding="utf-8"?>
+<file path=ppt/slides/slide5.xml><?xml version="1.0" encoding="utf-8"?>
+<p:sld xmlns:a="http://schemas.openxmlformats.org/drawingml/2006/main" xmlns:r="http://schemas.openxmlformats.org/officeDocument/2006/relationships" xmlns:p="http://schemas.openxmlformats.org/presentationml/2006/main">
+  <p:cSld>
+    <p:spTree>
+      <p:nvGrpSpPr>
+        <p:cNvPr id="1" name=""/>
+        <p:cNvGrpSpPr/>
+        <p:nvPr/>
+      </p:nvGrpSpPr>
+      <p:grpSpPr>
+        <a:xfrm>
+          <a:off x="0" y="0"/>
+          <a:ext cx="0" cy="0"/>
+          <a:chOff x="0" y="0"/>
+          <a:chExt cx="0" cy="0"/>
+        </a:xfrm>
+      </p:grpSpPr>
+      <p:sp>
+        <p:nvSpPr>
+          <p:cNvPr id="2" name="Title 1"/>
+          <p:cNvSpPr>
+            <a:spLocks noGrp="1"/>
+          </p:cNvSpPr>
+          <p:nvPr>
+            <p:ph type="title"/>
+          </p:nvPr>
+        </p:nvSpPr>
+        <p:spPr/>
+        <p:txBody>
+          <a:bodyPr/>
+          <a:lstStyle/>
+          <a:p>
+            <a:r>
+              <a:rPr lang="en-US" dirty="0"/>
+              <a:t>Types of Intruder</a:t>
+            </a:r>
+          </a:p>
+        </p:txBody>
+      </p:sp>
+      <p:sp>
+        <p:nvSpPr>
+          <p:cNvPr id="3" name="Content Placeholder 2"/>
+          <p:cNvSpPr>
+            <a:spLocks noGrp="1"/>
+          </p:cNvSpPr>
+          <p:nvPr>
+            <p:ph idx="1"/>
+          </p:nvPr>
+        </p:nvSpPr>
+        <p:spPr/>
+        <p:txBody>
+          <a:bodyPr/>
+          <a:lstStyle/>
+          <a:p>
+            <a:r>
+              <a:rPr lang="en-US" b="1" dirty="0">
+                <a:solidFill>
+                  <a:srgbClr val="C00000"/>
+                </a:solidFill>
+              </a:rPr>
+              <a:t>Casual</a:t>
+            </a:r>
+            <a:r>
+              <a:rPr lang="en-US" dirty="0"/>
+              <a:t> prying/spying</a:t>
+            </a:r>
+          </a:p>
+          <a:p>
+            <a:endParaRPr lang="en-US" dirty="0"/>
+          </a:p>
+          <a:p>
+            <a:r>
+              <a:rPr lang="en-US" dirty="0"/>
+              <a:t>Snooping by insiders (“insider attacks”)</a:t>
+            </a:r>
+          </a:p>
+          <a:p>
+            <a:endParaRPr lang="en-US" dirty="0"/>
+          </a:p>
+          <a:p>
+            <a:r>
+              <a:rPr lang="en-US" b="1" dirty="0">
+                <a:solidFill>
+                  <a:srgbClr val="C00000"/>
+                </a:solidFill>
+              </a:rPr>
+              <a:t>Financial motives: </a:t>
+            </a:r>
+            <a:r>
+              <a:rPr lang="en-US" dirty="0"/>
+              <a:t>Attempts to make money</a:t>
+            </a:r>
+          </a:p>
+          <a:p>
+            <a:endParaRPr lang="en-US" dirty="0"/>
+          </a:p>
+          <a:p>
+            <a:r>
+              <a:rPr lang="en-US" b="1" dirty="0">
+                <a:solidFill>
+                  <a:srgbClr val="C00000"/>
+                </a:solidFill>
+              </a:rPr>
+              <a:t>Data motives:</a:t>
+            </a:r>
+            <a:r>
+              <a:rPr lang="en-US" dirty="0"/>
+              <a:t> Espionage (Commercial, military)</a:t>
+            </a:r>
+          </a:p>
+        </p:txBody>
+      </p:sp>
+    </p:spTree>
+    <p:extLst>
+      <p:ext uri="{BB962C8B-B14F-4D97-AF65-F5344CB8AC3E}">
+        <p14:creationId xmlns:p14="http://schemas.microsoft.com/office/powerpoint/2010/main" val="4249687917"/>
+      </p:ext>
+    </p:extLst>
+  </p:cSld>
+  <p:clrMapOvr>
+    <a:masterClrMapping/>
+  </p:clrMapOvr>
+</p:sld>
+</file>
+
+<file path=ppt/slides/slide50.xml><?xml version="1.0" encoding="utf-8"?>
 <p:sld xmlns:a="http://schemas.openxmlformats.org/drawingml/2006/main" xmlns:r="http://schemas.openxmlformats.org/officeDocument/2006/relationships" xmlns:p="http://schemas.openxmlformats.org/presentationml/2006/main" show="0">
   <p:cSld>
     <p:spTree>
@@ -24192,132 +25145,7 @@
 </p:sld>
 </file>
 
-<file path=ppt/slides/slide5.xml><?xml version="1.0" encoding="utf-8"?>
-<p:sld xmlns:a="http://schemas.openxmlformats.org/drawingml/2006/main" xmlns:r="http://schemas.openxmlformats.org/officeDocument/2006/relationships" xmlns:p="http://schemas.openxmlformats.org/presentationml/2006/main">
-  <p:cSld>
-    <p:spTree>
-      <p:nvGrpSpPr>
-        <p:cNvPr id="1" name=""/>
-        <p:cNvGrpSpPr/>
-        <p:nvPr/>
-      </p:nvGrpSpPr>
-      <p:grpSpPr>
-        <a:xfrm>
-          <a:off x="0" y="0"/>
-          <a:ext cx="0" cy="0"/>
-          <a:chOff x="0" y="0"/>
-          <a:chExt cx="0" cy="0"/>
-        </a:xfrm>
-      </p:grpSpPr>
-      <p:sp>
-        <p:nvSpPr>
-          <p:cNvPr id="2" name="Title 1"/>
-          <p:cNvSpPr>
-            <a:spLocks noGrp="1"/>
-          </p:cNvSpPr>
-          <p:nvPr>
-            <p:ph type="title"/>
-          </p:nvPr>
-        </p:nvSpPr>
-        <p:spPr/>
-        <p:txBody>
-          <a:bodyPr/>
-          <a:lstStyle/>
-          <a:p>
-            <a:r>
-              <a:rPr lang="en-US" dirty="0"/>
-              <a:t>Types of Intruder</a:t>
-            </a:r>
-          </a:p>
-        </p:txBody>
-      </p:sp>
-      <p:sp>
-        <p:nvSpPr>
-          <p:cNvPr id="3" name="Content Placeholder 2"/>
-          <p:cNvSpPr>
-            <a:spLocks noGrp="1"/>
-          </p:cNvSpPr>
-          <p:nvPr>
-            <p:ph idx="1"/>
-          </p:nvPr>
-        </p:nvSpPr>
-        <p:spPr/>
-        <p:txBody>
-          <a:bodyPr/>
-          <a:lstStyle/>
-          <a:p>
-            <a:r>
-              <a:rPr lang="en-US" b="1" dirty="0">
-                <a:solidFill>
-                  <a:srgbClr val="C00000"/>
-                </a:solidFill>
-              </a:rPr>
-              <a:t>Casual</a:t>
-            </a:r>
-            <a:r>
-              <a:rPr lang="en-US" dirty="0"/>
-              <a:t> prying/spying</a:t>
-            </a:r>
-          </a:p>
-          <a:p>
-            <a:endParaRPr lang="en-US" dirty="0"/>
-          </a:p>
-          <a:p>
-            <a:r>
-              <a:rPr lang="en-US" dirty="0"/>
-              <a:t>Snooping by insiders (“insider attacks”)</a:t>
-            </a:r>
-          </a:p>
-          <a:p>
-            <a:endParaRPr lang="en-US" dirty="0"/>
-          </a:p>
-          <a:p>
-            <a:r>
-              <a:rPr lang="en-US" b="1" dirty="0">
-                <a:solidFill>
-                  <a:srgbClr val="C00000"/>
-                </a:solidFill>
-              </a:rPr>
-              <a:t>Financial motives: </a:t>
-            </a:r>
-            <a:r>
-              <a:rPr lang="en-US" dirty="0"/>
-              <a:t>Attempts to make money</a:t>
-            </a:r>
-          </a:p>
-          <a:p>
-            <a:endParaRPr lang="en-US" dirty="0"/>
-          </a:p>
-          <a:p>
-            <a:r>
-              <a:rPr lang="en-US" b="1" dirty="0">
-                <a:solidFill>
-                  <a:srgbClr val="C00000"/>
-                </a:solidFill>
-              </a:rPr>
-              <a:t>Data motives:</a:t>
-            </a:r>
-            <a:r>
-              <a:rPr lang="en-US" dirty="0"/>
-              <a:t> Espionage (Commercial, military)</a:t>
-            </a:r>
-          </a:p>
-        </p:txBody>
-      </p:sp>
-    </p:spTree>
-    <p:extLst>
-      <p:ext uri="{BB962C8B-B14F-4D97-AF65-F5344CB8AC3E}">
-        <p14:creationId xmlns:p14="http://schemas.microsoft.com/office/powerpoint/2010/main" val="4249687917"/>
-      </p:ext>
-    </p:extLst>
-  </p:cSld>
-  <p:clrMapOvr>
-    <a:masterClrMapping/>
-  </p:clrMapOvr>
-</p:sld>
-</file>
-
-<file path=ppt/slides/slide50.xml><?xml version="1.0" encoding="utf-8"?>
+<file path=ppt/slides/slide51.xml><?xml version="1.0" encoding="utf-8"?>
 <p:sld xmlns:a="http://schemas.openxmlformats.org/drawingml/2006/main" xmlns:r="http://schemas.openxmlformats.org/officeDocument/2006/relationships" xmlns:p="http://schemas.openxmlformats.org/presentationml/2006/main" show="0">
   <p:cSld>
     <p:spTree>
@@ -24447,144 +25275,6 @@
 </p:sld>
 </file>
 
-<file path=ppt/slides/slide51.xml><?xml version="1.0" encoding="utf-8"?>
-<p:sld xmlns:a="http://schemas.openxmlformats.org/drawingml/2006/main" xmlns:r="http://schemas.openxmlformats.org/officeDocument/2006/relationships" xmlns:p="http://schemas.openxmlformats.org/presentationml/2006/main" show="0">
-  <p:cSld>
-    <p:spTree>
-      <p:nvGrpSpPr>
-        <p:cNvPr id="1" name=""/>
-        <p:cNvGrpSpPr/>
-        <p:nvPr/>
-      </p:nvGrpSpPr>
-      <p:grpSpPr>
-        <a:xfrm>
-          <a:off x="0" y="0"/>
-          <a:ext cx="0" cy="0"/>
-          <a:chOff x="0" y="0"/>
-          <a:chExt cx="0" cy="0"/>
-        </a:xfrm>
-      </p:grpSpPr>
-      <p:sp>
-        <p:nvSpPr>
-          <p:cNvPr id="2" name="Title 1"/>
-          <p:cNvSpPr>
-            <a:spLocks noGrp="1"/>
-          </p:cNvSpPr>
-          <p:nvPr>
-            <p:ph type="title"/>
-          </p:nvPr>
-        </p:nvSpPr>
-        <p:spPr/>
-        <p:txBody>
-          <a:bodyPr/>
-          <a:lstStyle/>
-          <a:p>
-            <a:r>
-              <a:rPr lang="en-US" dirty="0"/>
-              <a:t>Access Control Policy </a:t>
-            </a:r>
-          </a:p>
-        </p:txBody>
-      </p:sp>
-      <p:sp>
-        <p:nvSpPr>
-          <p:cNvPr id="3" name="Content Placeholder 2"/>
-          <p:cNvSpPr>
-            <a:spLocks noGrp="1"/>
-          </p:cNvSpPr>
-          <p:nvPr>
-            <p:ph idx="1"/>
-          </p:nvPr>
-        </p:nvSpPr>
-        <p:spPr>
-          <a:xfrm>
-            <a:off x="1485900" y="1200152"/>
-            <a:ext cx="6300788" cy="3394472"/>
-          </a:xfrm>
-        </p:spPr>
-        <p:txBody>
-          <a:bodyPr>
-            <a:normAutofit fontScale="92500" lnSpcReduction="10000"/>
-          </a:bodyPr>
-          <a:lstStyle/>
-          <a:p>
-            <a:pPr marL="0" indent="0">
-              <a:buNone/>
-            </a:pPr>
-            <a:r>
-              <a:rPr lang="en-US" dirty="0"/>
-              <a:t>Who sets policy?</a:t>
-            </a:r>
-          </a:p>
-          <a:p>
-            <a:pPr lvl="1"/>
-            <a:r>
-              <a:rPr lang="en-US" dirty="0"/>
-              <a:t>(Theoretically) users, with system defaults and restrictions</a:t>
-            </a:r>
-          </a:p>
-          <a:p>
-            <a:pPr lvl="1"/>
-            <a:endParaRPr lang="en-US" dirty="0"/>
-          </a:p>
-          <a:p>
-            <a:pPr marL="0" indent="0">
-              <a:buNone/>
-            </a:pPr>
-            <a:r>
-              <a:rPr lang="en-US" dirty="0"/>
-              <a:t>How is access control list stored?</a:t>
-            </a:r>
-          </a:p>
-          <a:p>
-            <a:pPr lvl="1"/>
-            <a:r>
-              <a:rPr lang="en-US" dirty="0"/>
-              <a:t>Sparse matrix (default deny), store as list</a:t>
-            </a:r>
-          </a:p>
-          <a:p>
-            <a:pPr lvl="1"/>
-            <a:endParaRPr lang="en-US" dirty="0"/>
-          </a:p>
-          <a:p>
-            <a:pPr marL="0" indent="0">
-              <a:buNone/>
-            </a:pPr>
-            <a:r>
-              <a:rPr lang="en-US" dirty="0"/>
-              <a:t>How does OS enforce policy?</a:t>
-            </a:r>
-          </a:p>
-          <a:p>
-            <a:pPr lvl="1"/>
-            <a:r>
-              <a:rPr lang="en-US" dirty="0"/>
-              <a:t>OS exposes API to apps, with privileged operations</a:t>
-            </a:r>
-          </a:p>
-          <a:p>
-            <a:pPr lvl="1"/>
-            <a:r>
-              <a:rPr lang="en-US" dirty="0"/>
-              <a:t>Checks ACL when API functions are called</a:t>
-            </a:r>
-          </a:p>
-        </p:txBody>
-      </p:sp>
-    </p:spTree>
-    <p:extLst>
-      <p:ext uri="{BB962C8B-B14F-4D97-AF65-F5344CB8AC3E}">
-        <p14:creationId xmlns:p14="http://schemas.microsoft.com/office/powerpoint/2010/main" val="1011474182"/>
-      </p:ext>
-    </p:extLst>
-  </p:cSld>
-  <p:clrMapOvr>
-    <a:masterClrMapping/>
-  </p:clrMapOvr>
-</p:sld>
-</file>
-
 <file path=ppt/slides/slide52.xml><?xml version="1.0" encoding="utf-8"?>
 <p:sld xmlns:a="http://schemas.openxmlformats.org/drawingml/2006/main" xmlns:r="http://schemas.openxmlformats.org/officeDocument/2006/relationships" xmlns:p="http://schemas.openxmlformats.org/presentationml/2006/main" show="0">
   <p:cSld>
@@ -24614,6 +25304,144 @@
         </p:nvSpPr>
         <p:spPr/>
         <p:txBody>
+          <a:bodyPr/>
+          <a:lstStyle/>
+          <a:p>
+            <a:r>
+              <a:rPr lang="en-US" dirty="0"/>
+              <a:t>Access Control Policy </a:t>
+            </a:r>
+          </a:p>
+        </p:txBody>
+      </p:sp>
+      <p:sp>
+        <p:nvSpPr>
+          <p:cNvPr id="3" name="Content Placeholder 2"/>
+          <p:cNvSpPr>
+            <a:spLocks noGrp="1"/>
+          </p:cNvSpPr>
+          <p:nvPr>
+            <p:ph idx="1"/>
+          </p:nvPr>
+        </p:nvSpPr>
+        <p:spPr>
+          <a:xfrm>
+            <a:off x="1485900" y="1200152"/>
+            <a:ext cx="6300788" cy="3394472"/>
+          </a:xfrm>
+        </p:spPr>
+        <p:txBody>
+          <a:bodyPr>
+            <a:normAutofit fontScale="92500" lnSpcReduction="10000"/>
+          </a:bodyPr>
+          <a:lstStyle/>
+          <a:p>
+            <a:pPr marL="0" indent="0">
+              <a:buNone/>
+            </a:pPr>
+            <a:r>
+              <a:rPr lang="en-US" dirty="0"/>
+              <a:t>Who sets policy?</a:t>
+            </a:r>
+          </a:p>
+          <a:p>
+            <a:pPr lvl="1"/>
+            <a:r>
+              <a:rPr lang="en-US" dirty="0"/>
+              <a:t>(Theoretically) users, with system defaults and restrictions</a:t>
+            </a:r>
+          </a:p>
+          <a:p>
+            <a:pPr lvl="1"/>
+            <a:endParaRPr lang="en-US" dirty="0"/>
+          </a:p>
+          <a:p>
+            <a:pPr marL="0" indent="0">
+              <a:buNone/>
+            </a:pPr>
+            <a:r>
+              <a:rPr lang="en-US" dirty="0"/>
+              <a:t>How is access control list stored?</a:t>
+            </a:r>
+          </a:p>
+          <a:p>
+            <a:pPr lvl="1"/>
+            <a:r>
+              <a:rPr lang="en-US" dirty="0"/>
+              <a:t>Sparse matrix (default deny), store as list</a:t>
+            </a:r>
+          </a:p>
+          <a:p>
+            <a:pPr lvl="1"/>
+            <a:endParaRPr lang="en-US" dirty="0"/>
+          </a:p>
+          <a:p>
+            <a:pPr marL="0" indent="0">
+              <a:buNone/>
+            </a:pPr>
+            <a:r>
+              <a:rPr lang="en-US" dirty="0"/>
+              <a:t>How does OS enforce policy?</a:t>
+            </a:r>
+          </a:p>
+          <a:p>
+            <a:pPr lvl="1"/>
+            <a:r>
+              <a:rPr lang="en-US" dirty="0"/>
+              <a:t>OS exposes API to apps, with privileged operations</a:t>
+            </a:r>
+          </a:p>
+          <a:p>
+            <a:pPr lvl="1"/>
+            <a:r>
+              <a:rPr lang="en-US" dirty="0"/>
+              <a:t>Checks ACL when API functions are called</a:t>
+            </a:r>
+          </a:p>
+        </p:txBody>
+      </p:sp>
+    </p:spTree>
+    <p:extLst>
+      <p:ext uri="{BB962C8B-B14F-4D97-AF65-F5344CB8AC3E}">
+        <p14:creationId xmlns:p14="http://schemas.microsoft.com/office/powerpoint/2010/main" val="1011474182"/>
+      </p:ext>
+    </p:extLst>
+  </p:cSld>
+  <p:clrMapOvr>
+    <a:masterClrMapping/>
+  </p:clrMapOvr>
+</p:sld>
+</file>
+
+<file path=ppt/slides/slide53.xml><?xml version="1.0" encoding="utf-8"?>
+<p:sld xmlns:a="http://schemas.openxmlformats.org/drawingml/2006/main" xmlns:r="http://schemas.openxmlformats.org/officeDocument/2006/relationships" xmlns:p="http://schemas.openxmlformats.org/presentationml/2006/main" show="0">
+  <p:cSld>
+    <p:spTree>
+      <p:nvGrpSpPr>
+        <p:cNvPr id="1" name=""/>
+        <p:cNvGrpSpPr/>
+        <p:nvPr/>
+      </p:nvGrpSpPr>
+      <p:grpSpPr>
+        <a:xfrm>
+          <a:off x="0" y="0"/>
+          <a:ext cx="0" cy="0"/>
+          <a:chOff x="0" y="0"/>
+          <a:chExt cx="0" cy="0"/>
+        </a:xfrm>
+      </p:grpSpPr>
+      <p:sp>
+        <p:nvSpPr>
+          <p:cNvPr id="2" name="Title 1"/>
+          <p:cNvSpPr>
+            <a:spLocks noGrp="1"/>
+          </p:cNvSpPr>
+          <p:nvPr>
+            <p:ph type="title"/>
+          </p:nvPr>
+        </p:nvSpPr>
+        <p:spPr/>
+        <p:txBody>
           <a:bodyPr>
             <a:normAutofit/>
           </a:bodyPr>
@@ -24683,7 +25511,7 @@
 </p:sld>
 </file>
 
-<file path=ppt/slides/slide53.xml><?xml version="1.0" encoding="utf-8"?>
+<file path=ppt/slides/slide54.xml><?xml version="1.0" encoding="utf-8"?>
 <p:sld xmlns:a="http://schemas.openxmlformats.org/drawingml/2006/main" xmlns:r="http://schemas.openxmlformats.org/officeDocument/2006/relationships" xmlns:p="http://schemas.openxmlformats.org/presentationml/2006/main" show="0">
   <p:cSld>
     <p:spTree>
@@ -24829,7 +25657,7 @@
           <a:noFill/>
           <a:extLst>
             <a:ext uri="{909E8E84-426E-40dd-AFC4-6F175D3DCCD1}">
-              <a14:hiddenFill xmlns:a14="http://schemas.microsoft.com/office/drawing/2010/main" xmlns="">
+              <a14:hiddenFill xmlns="" xmlns:a14="http://schemas.microsoft.com/office/drawing/2010/main">
                 <a:solidFill>
                   <a:srgbClr val="FFFFFF"/>
                 </a:solidFill>
@@ -24842,69 +25670,6 @@
     <p:extLst>
       <p:ext uri="{BB962C8B-B14F-4D97-AF65-F5344CB8AC3E}">
         <p14:creationId xmlns:p14="http://schemas.microsoft.com/office/powerpoint/2010/main" val="3812954006"/>
-      </p:ext>
-    </p:extLst>
-  </p:cSld>
-  <p:clrMapOvr>
-    <a:masterClrMapping/>
-  </p:clrMapOvr>
-</p:sld>
-</file>
-
-<file path=ppt/slides/slide54.xml><?xml version="1.0" encoding="utf-8"?>
-<p:sld xmlns:a="http://schemas.openxmlformats.org/drawingml/2006/main" xmlns:r="http://schemas.openxmlformats.org/officeDocument/2006/relationships" xmlns:p="http://schemas.openxmlformats.org/presentationml/2006/main" show="0">
-  <p:cSld>
-    <p:spTree>
-      <p:nvGrpSpPr>
-        <p:cNvPr id="1" name=""/>
-        <p:cNvGrpSpPr/>
-        <p:nvPr/>
-      </p:nvGrpSpPr>
-      <p:grpSpPr>
-        <a:xfrm>
-          <a:off x="0" y="0"/>
-          <a:ext cx="0" cy="0"/>
-          <a:chOff x="0" y="0"/>
-          <a:chExt cx="0" cy="0"/>
-        </a:xfrm>
-      </p:grpSpPr>
-      <p:sp>
-        <p:nvSpPr>
-          <p:cNvPr id="2" name="Title 1">
-            <a:extLst>
-              <a:ext uri="{FF2B5EF4-FFF2-40B4-BE49-F238E27FC236}">
-                <a16:creationId xmlns:a16="http://schemas.microsoft.com/office/drawing/2014/main" id="{8CC5B937-D9F7-DE48-A943-2F971EED2B6F}"/>
-              </a:ext>
-            </a:extLst>
-          </p:cNvPr>
-          <p:cNvSpPr>
-            <a:spLocks noGrp="1"/>
-          </p:cNvSpPr>
-          <p:nvPr>
-            <p:ph type="title"/>
-          </p:nvPr>
-        </p:nvSpPr>
-        <p:spPr>
-          <a:xfrm>
-            <a:off x="609600" y="1714500"/>
-            <a:ext cx="8229600" cy="857250"/>
-          </a:xfrm>
-        </p:spPr>
-        <p:txBody>
-          <a:bodyPr/>
-          <a:lstStyle/>
-          <a:p>
-            <a:r>
-              <a:rPr lang="en-US" dirty="0"/>
-              <a:t>Other Abstractions</a:t>
-            </a:r>
-          </a:p>
-        </p:txBody>
-      </p:sp>
-    </p:spTree>
-    <p:extLst>
-      <p:ext uri="{BB962C8B-B14F-4D97-AF65-F5344CB8AC3E}">
-        <p14:creationId xmlns:p14="http://schemas.microsoft.com/office/powerpoint/2010/main" val="3846728977"/>
       </p:ext>
     </p:extLst>
   </p:cSld>
@@ -24933,6 +25698,69 @@
       </p:grpSpPr>
       <p:sp>
         <p:nvSpPr>
+          <p:cNvPr id="2" name="Title 1">
+            <a:extLst>
+              <a:ext uri="{FF2B5EF4-FFF2-40B4-BE49-F238E27FC236}">
+                <a16:creationId xmlns:a16="http://schemas.microsoft.com/office/drawing/2014/main" id="{8CC5B937-D9F7-DE48-A943-2F971EED2B6F}"/>
+              </a:ext>
+            </a:extLst>
+          </p:cNvPr>
+          <p:cNvSpPr>
+            <a:spLocks noGrp="1"/>
+          </p:cNvSpPr>
+          <p:nvPr>
+            <p:ph type="title"/>
+          </p:nvPr>
+        </p:nvSpPr>
+        <p:spPr>
+          <a:xfrm>
+            <a:off x="609600" y="1714500"/>
+            <a:ext cx="8229600" cy="857250"/>
+          </a:xfrm>
+        </p:spPr>
+        <p:txBody>
+          <a:bodyPr/>
+          <a:lstStyle/>
+          <a:p>
+            <a:r>
+              <a:rPr lang="en-US" dirty="0"/>
+              <a:t>Other Abstractions</a:t>
+            </a:r>
+          </a:p>
+        </p:txBody>
+      </p:sp>
+    </p:spTree>
+    <p:extLst>
+      <p:ext uri="{BB962C8B-B14F-4D97-AF65-F5344CB8AC3E}">
+        <p14:creationId xmlns:p14="http://schemas.microsoft.com/office/powerpoint/2010/main" val="3846728977"/>
+      </p:ext>
+    </p:extLst>
+  </p:cSld>
+  <p:clrMapOvr>
+    <a:masterClrMapping/>
+  </p:clrMapOvr>
+</p:sld>
+</file>
+
+<file path=ppt/slides/slide56.xml><?xml version="1.0" encoding="utf-8"?>
+<p:sld xmlns:a="http://schemas.openxmlformats.org/drawingml/2006/main" xmlns:r="http://schemas.openxmlformats.org/officeDocument/2006/relationships" xmlns:p="http://schemas.openxmlformats.org/presentationml/2006/main" show="0">
+  <p:cSld>
+    <p:spTree>
+      <p:nvGrpSpPr>
+        <p:cNvPr id="1" name=""/>
+        <p:cNvGrpSpPr/>
+        <p:nvPr/>
+      </p:nvGrpSpPr>
+      <p:grpSpPr>
+        <a:xfrm>
+          <a:off x="0" y="0"/>
+          <a:ext cx="0" cy="0"/>
+          <a:chOff x="0" y="0"/>
+          <a:chExt cx="0" cy="0"/>
+        </a:xfrm>
+      </p:grpSpPr>
+      <p:sp>
+        <p:nvSpPr>
           <p:cNvPr id="2" name="Title 1"/>
           <p:cNvSpPr>
             <a:spLocks noGrp="1"/>
@@ -25003,7 +25831,7 @@
 </p:sld>
 </file>
 
-<file path=ppt/slides/slide56.xml><?xml version="1.0" encoding="utf-8"?>
+<file path=ppt/slides/slide57.xml><?xml version="1.0" encoding="utf-8"?>
 <p:sld xmlns:a="http://schemas.openxmlformats.org/drawingml/2006/main" xmlns:r="http://schemas.openxmlformats.org/officeDocument/2006/relationships" xmlns:p="http://schemas.openxmlformats.org/presentationml/2006/main" show="0">
   <p:cSld>
     <p:spTree>
@@ -25315,7 +26143,7 @@
 </p:sld>
 </file>
 
-<file path=ppt/slides/slide57.xml><?xml version="1.0" encoding="utf-8"?>
+<file path=ppt/slides/slide58.xml><?xml version="1.0" encoding="utf-8"?>
 <p:sld xmlns:a="http://schemas.openxmlformats.org/drawingml/2006/main" xmlns:r="http://schemas.openxmlformats.org/officeDocument/2006/relationships" xmlns:p="http://schemas.openxmlformats.org/presentationml/2006/main" show="0">
   <p:cSld>
     <p:spTree>

</xml_diff>